<commit_message>
Partie 2 du tutorial 2
</commit_message>
<xml_diff>
--- a/sources/maker.pptx
+++ b/sources/maker.pptx
@@ -6,6 +6,9 @@
   </p:sldMasterIdLst>
   <p:sldIdLst>
     <p:sldId id="256" r:id="rId2"/>
+    <p:sldId id="257" r:id="rId3"/>
+    <p:sldId id="258" r:id="rId4"/>
+    <p:sldId id="259" r:id="rId5"/>
   </p:sldIdLst>
   <p:sldSz cx="12192000" cy="6858000"/>
   <p:notesSz cx="6858000" cy="9144000"/>
@@ -104,6 +107,11 @@
       </a:defRPr>
     </a:lvl9pPr>
   </p:defaultTextStyle>
+  <p:extLst>
+    <p:ext uri="{EFAFB233-063F-42B5-8137-9DF3F51BA10A}">
+      <p15:sldGuideLst xmlns:p15="http://schemas.microsoft.com/office/powerpoint/2012/main"/>
+    </p:ext>
+  </p:extLst>
 </p:presentation>
 </file>
 
@@ -238,7 +246,7 @@
           <a:p>
             <a:fld id="{78AEA460-6B09-4BD5-A6BB-D74A7FA93045}" type="datetimeFigureOut">
               <a:rPr lang="en-GB" smtClean="0"/>
-              <a:t>04/11/2017</a:t>
+              <a:t>07/11/2017</a:t>
             </a:fld>
             <a:endParaRPr lang="en-GB"/>
           </a:p>
@@ -408,7 +416,7 @@
           <a:p>
             <a:fld id="{78AEA460-6B09-4BD5-A6BB-D74A7FA93045}" type="datetimeFigureOut">
               <a:rPr lang="en-GB" smtClean="0"/>
-              <a:t>04/11/2017</a:t>
+              <a:t>07/11/2017</a:t>
             </a:fld>
             <a:endParaRPr lang="en-GB"/>
           </a:p>
@@ -588,7 +596,7 @@
           <a:p>
             <a:fld id="{78AEA460-6B09-4BD5-A6BB-D74A7FA93045}" type="datetimeFigureOut">
               <a:rPr lang="en-GB" smtClean="0"/>
-              <a:t>04/11/2017</a:t>
+              <a:t>07/11/2017</a:t>
             </a:fld>
             <a:endParaRPr lang="en-GB"/>
           </a:p>
@@ -758,7 +766,7 @@
           <a:p>
             <a:fld id="{78AEA460-6B09-4BD5-A6BB-D74A7FA93045}" type="datetimeFigureOut">
               <a:rPr lang="en-GB" smtClean="0"/>
-              <a:t>04/11/2017</a:t>
+              <a:t>07/11/2017</a:t>
             </a:fld>
             <a:endParaRPr lang="en-GB"/>
           </a:p>
@@ -1004,7 +1012,7 @@
           <a:p>
             <a:fld id="{78AEA460-6B09-4BD5-A6BB-D74A7FA93045}" type="datetimeFigureOut">
               <a:rPr lang="en-GB" smtClean="0"/>
-              <a:t>04/11/2017</a:t>
+              <a:t>07/11/2017</a:t>
             </a:fld>
             <a:endParaRPr lang="en-GB"/>
           </a:p>
@@ -1236,7 +1244,7 @@
           <a:p>
             <a:fld id="{78AEA460-6B09-4BD5-A6BB-D74A7FA93045}" type="datetimeFigureOut">
               <a:rPr lang="en-GB" smtClean="0"/>
-              <a:t>04/11/2017</a:t>
+              <a:t>07/11/2017</a:t>
             </a:fld>
             <a:endParaRPr lang="en-GB"/>
           </a:p>
@@ -1603,7 +1611,7 @@
           <a:p>
             <a:fld id="{78AEA460-6B09-4BD5-A6BB-D74A7FA93045}" type="datetimeFigureOut">
               <a:rPr lang="en-GB" smtClean="0"/>
-              <a:t>04/11/2017</a:t>
+              <a:t>07/11/2017</a:t>
             </a:fld>
             <a:endParaRPr lang="en-GB"/>
           </a:p>
@@ -1721,7 +1729,7 @@
           <a:p>
             <a:fld id="{78AEA460-6B09-4BD5-A6BB-D74A7FA93045}" type="datetimeFigureOut">
               <a:rPr lang="en-GB" smtClean="0"/>
-              <a:t>04/11/2017</a:t>
+              <a:t>07/11/2017</a:t>
             </a:fld>
             <a:endParaRPr lang="en-GB"/>
           </a:p>
@@ -1816,7 +1824,7 @@
           <a:p>
             <a:fld id="{78AEA460-6B09-4BD5-A6BB-D74A7FA93045}" type="datetimeFigureOut">
               <a:rPr lang="en-GB" smtClean="0"/>
-              <a:t>04/11/2017</a:t>
+              <a:t>07/11/2017</a:t>
             </a:fld>
             <a:endParaRPr lang="en-GB"/>
           </a:p>
@@ -2093,7 +2101,7 @@
           <a:p>
             <a:fld id="{78AEA460-6B09-4BD5-A6BB-D74A7FA93045}" type="datetimeFigureOut">
               <a:rPr lang="en-GB" smtClean="0"/>
-              <a:t>04/11/2017</a:t>
+              <a:t>07/11/2017</a:t>
             </a:fld>
             <a:endParaRPr lang="en-GB"/>
           </a:p>
@@ -2346,7 +2354,7 @@
           <a:p>
             <a:fld id="{78AEA460-6B09-4BD5-A6BB-D74A7FA93045}" type="datetimeFigureOut">
               <a:rPr lang="en-GB" smtClean="0"/>
-              <a:t>04/11/2017</a:t>
+              <a:t>07/11/2017</a:t>
             </a:fld>
             <a:endParaRPr lang="en-GB"/>
           </a:p>
@@ -2559,7 +2567,7 @@
           <a:p>
             <a:fld id="{78AEA460-6B09-4BD5-A6BB-D74A7FA93045}" type="datetimeFigureOut">
               <a:rPr lang="en-GB" smtClean="0"/>
-              <a:t>04/11/2017</a:t>
+              <a:t>07/11/2017</a:t>
             </a:fld>
             <a:endParaRPr lang="en-GB"/>
           </a:p>
@@ -3515,6 +3523,977 @@
 </p:sld>
 </file>
 
+<file path=ppt/slides/slide2.xml><?xml version="1.0" encoding="utf-8"?>
+<p:sld xmlns:a="http://schemas.openxmlformats.org/drawingml/2006/main" xmlns:r="http://schemas.openxmlformats.org/officeDocument/2006/relationships" xmlns:p="http://schemas.openxmlformats.org/presentationml/2006/main">
+  <p:cSld>
+    <p:spTree>
+      <p:nvGrpSpPr>
+        <p:cNvPr id="1" name=""/>
+        <p:cNvGrpSpPr/>
+        <p:nvPr/>
+      </p:nvGrpSpPr>
+      <p:grpSpPr>
+        <a:xfrm>
+          <a:off x="0" y="0"/>
+          <a:ext cx="0" cy="0"/>
+          <a:chOff x="0" y="0"/>
+          <a:chExt cx="0" cy="0"/>
+        </a:xfrm>
+      </p:grpSpPr>
+      <p:pic>
+        <p:nvPicPr>
+          <p:cNvPr id="4" name="Image 3"/>
+          <p:cNvPicPr>
+            <a:picLocks noChangeAspect="1"/>
+          </p:cNvPicPr>
+          <p:nvPr/>
+        </p:nvPicPr>
+        <p:blipFill>
+          <a:blip r:embed="rId2">
+            <a:extLst>
+              <a:ext uri="{28A0092B-C50C-407E-A947-70E740481C1C}">
+                <a14:useLocalDpi xmlns:a14="http://schemas.microsoft.com/office/drawing/2010/main" val="0"/>
+              </a:ext>
+            </a:extLst>
+          </a:blip>
+          <a:stretch>
+            <a:fillRect/>
+          </a:stretch>
+        </p:blipFill>
+        <p:spPr>
+          <a:xfrm>
+            <a:off x="1199466" y="532996"/>
+            <a:ext cx="9793067" cy="5792008"/>
+          </a:xfrm>
+          <a:prstGeom prst="rect">
+            <a:avLst/>
+          </a:prstGeom>
+        </p:spPr>
+      </p:pic>
+      <p:sp>
+        <p:nvSpPr>
+          <p:cNvPr id="6" name="Rectangle à coins arrondis 5"/>
+          <p:cNvSpPr/>
+          <p:nvPr/>
+        </p:nvSpPr>
+        <p:spPr>
+          <a:xfrm>
+            <a:off x="3486232" y="3580252"/>
+            <a:ext cx="1845278" cy="999985"/>
+          </a:xfrm>
+          <a:prstGeom prst="roundRect">
+            <a:avLst>
+              <a:gd name="adj" fmla="val 3444"/>
+            </a:avLst>
+          </a:prstGeom>
+          <a:solidFill>
+            <a:srgbClr val="FFC000">
+              <a:alpha val="40000"/>
+            </a:srgbClr>
+          </a:solidFill>
+        </p:spPr>
+        <p:style>
+          <a:lnRef idx="3">
+            <a:schemeClr val="lt1"/>
+          </a:lnRef>
+          <a:fillRef idx="1">
+            <a:schemeClr val="accent5"/>
+          </a:fillRef>
+          <a:effectRef idx="1">
+            <a:schemeClr val="accent5"/>
+          </a:effectRef>
+          <a:fontRef idx="minor">
+            <a:schemeClr val="lt1"/>
+          </a:fontRef>
+        </p:style>
+        <p:txBody>
+          <a:bodyPr rtlCol="0" anchor="ctr"/>
+          <a:lstStyle/>
+          <a:p>
+            <a:pPr algn="ctr"/>
+            <a:r>
+              <a:rPr lang="fr-FR" smtClean="0">
+                <a:solidFill>
+                  <a:schemeClr val="tx1"/>
+                </a:solidFill>
+              </a:rPr>
+              <a:t>Couleurs identiques</a:t>
+            </a:r>
+            <a:endParaRPr lang="en-GB">
+              <a:solidFill>
+                <a:schemeClr val="tx1"/>
+              </a:solidFill>
+            </a:endParaRPr>
+          </a:p>
+        </p:txBody>
+      </p:sp>
+      <p:cxnSp>
+        <p:nvCxnSpPr>
+          <p:cNvPr id="9" name="Connecteur droit avec flèche 8"/>
+          <p:cNvCxnSpPr>
+            <a:stCxn id="6" idx="2"/>
+          </p:cNvCxnSpPr>
+          <p:nvPr/>
+        </p:nvCxnSpPr>
+        <p:spPr>
+          <a:xfrm>
+            <a:off x="4408871" y="4580237"/>
+            <a:ext cx="0" cy="1367482"/>
+          </a:xfrm>
+          <a:prstGeom prst="straightConnector1">
+            <a:avLst/>
+          </a:prstGeom>
+          <a:ln w="76200">
+            <a:tailEnd type="triangle"/>
+          </a:ln>
+        </p:spPr>
+        <p:style>
+          <a:lnRef idx="1">
+            <a:schemeClr val="accent4"/>
+          </a:lnRef>
+          <a:fillRef idx="0">
+            <a:schemeClr val="accent4"/>
+          </a:fillRef>
+          <a:effectRef idx="0">
+            <a:schemeClr val="accent4"/>
+          </a:effectRef>
+          <a:fontRef idx="minor">
+            <a:schemeClr val="tx1"/>
+          </a:fontRef>
+        </p:style>
+      </p:cxnSp>
+      <p:cxnSp>
+        <p:nvCxnSpPr>
+          <p:cNvPr id="11" name="Connecteur droit avec flèche 10"/>
+          <p:cNvCxnSpPr>
+            <a:stCxn id="6" idx="1"/>
+          </p:cNvCxnSpPr>
+          <p:nvPr/>
+        </p:nvCxnSpPr>
+        <p:spPr>
+          <a:xfrm flipH="1" flipV="1">
+            <a:off x="2875005" y="4080243"/>
+            <a:ext cx="611227" cy="2"/>
+          </a:xfrm>
+          <a:prstGeom prst="straightConnector1">
+            <a:avLst/>
+          </a:prstGeom>
+          <a:ln w="76200">
+            <a:tailEnd type="triangle"/>
+          </a:ln>
+        </p:spPr>
+        <p:style>
+          <a:lnRef idx="1">
+            <a:schemeClr val="accent4"/>
+          </a:lnRef>
+          <a:fillRef idx="0">
+            <a:schemeClr val="accent4"/>
+          </a:fillRef>
+          <a:effectRef idx="0">
+            <a:schemeClr val="accent4"/>
+          </a:effectRef>
+          <a:fontRef idx="minor">
+            <a:schemeClr val="tx1"/>
+          </a:fontRef>
+        </p:style>
+      </p:cxnSp>
+      <p:sp>
+        <p:nvSpPr>
+          <p:cNvPr id="28" name="Rectangle à coins arrondis 27"/>
+          <p:cNvSpPr/>
+          <p:nvPr/>
+        </p:nvSpPr>
+        <p:spPr>
+          <a:xfrm>
+            <a:off x="5482090" y="3580252"/>
+            <a:ext cx="1509247" cy="999984"/>
+          </a:xfrm>
+          <a:prstGeom prst="roundRect">
+            <a:avLst>
+              <a:gd name="adj" fmla="val 3778"/>
+            </a:avLst>
+          </a:prstGeom>
+          <a:solidFill>
+            <a:srgbClr val="7030A0">
+              <a:alpha val="40000"/>
+            </a:srgbClr>
+          </a:solidFill>
+        </p:spPr>
+        <p:style>
+          <a:lnRef idx="3">
+            <a:schemeClr val="lt1"/>
+          </a:lnRef>
+          <a:fillRef idx="1">
+            <a:schemeClr val="accent1"/>
+          </a:fillRef>
+          <a:effectRef idx="1">
+            <a:schemeClr val="accent1"/>
+          </a:effectRef>
+          <a:fontRef idx="minor">
+            <a:schemeClr val="lt1"/>
+          </a:fontRef>
+        </p:style>
+        <p:txBody>
+          <a:bodyPr rtlCol="0" anchor="ctr"/>
+          <a:lstStyle/>
+          <a:p>
+            <a:pPr algn="ctr"/>
+            <a:r>
+              <a:rPr lang="fr-FR">
+                <a:solidFill>
+                  <a:schemeClr val="tx1"/>
+                </a:solidFill>
+              </a:rPr>
+              <a:t>Valeur </a:t>
+            </a:r>
+            <a:r>
+              <a:rPr lang="fr-FR" smtClean="0">
+                <a:solidFill>
+                  <a:schemeClr val="tx1"/>
+                </a:solidFill>
+              </a:rPr>
+              <a:t>identiques</a:t>
+            </a:r>
+            <a:endParaRPr lang="en-GB">
+              <a:solidFill>
+                <a:schemeClr val="tx1"/>
+              </a:solidFill>
+            </a:endParaRPr>
+          </a:p>
+        </p:txBody>
+      </p:sp>
+      <p:sp>
+        <p:nvSpPr>
+          <p:cNvPr id="36" name="Rectangle à coins arrondis 35"/>
+          <p:cNvSpPr/>
+          <p:nvPr/>
+        </p:nvSpPr>
+        <p:spPr>
+          <a:xfrm>
+            <a:off x="7178991" y="3580251"/>
+            <a:ext cx="1710211" cy="999985"/>
+          </a:xfrm>
+          <a:prstGeom prst="roundRect">
+            <a:avLst>
+              <a:gd name="adj" fmla="val 2368"/>
+            </a:avLst>
+          </a:prstGeom>
+          <a:solidFill>
+            <a:srgbClr val="C00000">
+              <a:alpha val="40000"/>
+            </a:srgbClr>
+          </a:solidFill>
+        </p:spPr>
+        <p:style>
+          <a:lnRef idx="3">
+            <a:schemeClr val="lt1"/>
+          </a:lnRef>
+          <a:fillRef idx="1">
+            <a:schemeClr val="accent1"/>
+          </a:fillRef>
+          <a:effectRef idx="1">
+            <a:schemeClr val="accent1"/>
+          </a:effectRef>
+          <a:fontRef idx="minor">
+            <a:schemeClr val="lt1"/>
+          </a:fontRef>
+        </p:style>
+        <p:txBody>
+          <a:bodyPr rtlCol="0" anchor="ctr"/>
+          <a:lstStyle/>
+          <a:p>
+            <a:pPr algn="ctr"/>
+            <a:r>
+              <a:rPr lang="fr-FR" smtClean="0">
+                <a:solidFill>
+                  <a:schemeClr val="tx1"/>
+                </a:solidFill>
+              </a:rPr>
+              <a:t>Max identiques</a:t>
+            </a:r>
+            <a:endParaRPr lang="en-GB">
+              <a:solidFill>
+                <a:schemeClr val="tx1"/>
+              </a:solidFill>
+            </a:endParaRPr>
+          </a:p>
+        </p:txBody>
+      </p:sp>
+      <p:cxnSp>
+        <p:nvCxnSpPr>
+          <p:cNvPr id="48" name="Connecteur en arc 47"/>
+          <p:cNvCxnSpPr>
+            <a:stCxn id="36" idx="2"/>
+          </p:cNvCxnSpPr>
+          <p:nvPr/>
+        </p:nvCxnSpPr>
+        <p:spPr>
+          <a:xfrm rot="5400000">
+            <a:off x="7015980" y="4525947"/>
+            <a:ext cx="963829" cy="1072407"/>
+          </a:xfrm>
+          <a:prstGeom prst="curvedConnector2">
+            <a:avLst/>
+          </a:prstGeom>
+          <a:ln w="76200">
+            <a:solidFill>
+              <a:srgbClr val="C00000"/>
+            </a:solidFill>
+            <a:tailEnd type="triangle"/>
+          </a:ln>
+        </p:spPr>
+        <p:style>
+          <a:lnRef idx="1">
+            <a:schemeClr val="accent1"/>
+          </a:lnRef>
+          <a:fillRef idx="0">
+            <a:schemeClr val="accent1"/>
+          </a:fillRef>
+          <a:effectRef idx="0">
+            <a:schemeClr val="accent1"/>
+          </a:effectRef>
+          <a:fontRef idx="minor">
+            <a:schemeClr val="tx1"/>
+          </a:fontRef>
+        </p:style>
+      </p:cxnSp>
+      <p:cxnSp>
+        <p:nvCxnSpPr>
+          <p:cNvPr id="50" name="Connecteur en arc 49"/>
+          <p:cNvCxnSpPr>
+            <a:stCxn id="36" idx="3"/>
+          </p:cNvCxnSpPr>
+          <p:nvPr/>
+        </p:nvCxnSpPr>
+        <p:spPr>
+          <a:xfrm>
+            <a:off x="8889202" y="4080244"/>
+            <a:ext cx="337177" cy="788317"/>
+          </a:xfrm>
+          <a:prstGeom prst="curvedConnector2">
+            <a:avLst/>
+          </a:prstGeom>
+          <a:ln w="76200">
+            <a:solidFill>
+              <a:srgbClr val="C00000"/>
+            </a:solidFill>
+            <a:tailEnd type="triangle"/>
+          </a:ln>
+        </p:spPr>
+        <p:style>
+          <a:lnRef idx="1">
+            <a:schemeClr val="accent1"/>
+          </a:lnRef>
+          <a:fillRef idx="0">
+            <a:schemeClr val="accent1"/>
+          </a:fillRef>
+          <a:effectRef idx="0">
+            <a:schemeClr val="accent1"/>
+          </a:effectRef>
+          <a:fontRef idx="minor">
+            <a:schemeClr val="tx1"/>
+          </a:fontRef>
+        </p:style>
+      </p:cxnSp>
+      <p:cxnSp>
+        <p:nvCxnSpPr>
+          <p:cNvPr id="54" name="Connecteur en arc 53"/>
+          <p:cNvCxnSpPr>
+            <a:stCxn id="28" idx="0"/>
+          </p:cNvCxnSpPr>
+          <p:nvPr/>
+        </p:nvCxnSpPr>
+        <p:spPr>
+          <a:xfrm rot="5400000" flipH="1" flipV="1">
+            <a:off x="6961309" y="2567331"/>
+            <a:ext cx="288326" cy="1737516"/>
+          </a:xfrm>
+          <a:prstGeom prst="curvedConnector2">
+            <a:avLst/>
+          </a:prstGeom>
+          <a:ln w="76200">
+            <a:solidFill>
+              <a:srgbClr val="7030A0"/>
+            </a:solidFill>
+            <a:tailEnd type="triangle"/>
+          </a:ln>
+        </p:spPr>
+        <p:style>
+          <a:lnRef idx="1">
+            <a:schemeClr val="accent1"/>
+          </a:lnRef>
+          <a:fillRef idx="0">
+            <a:schemeClr val="accent1"/>
+          </a:fillRef>
+          <a:effectRef idx="0">
+            <a:schemeClr val="accent1"/>
+          </a:effectRef>
+          <a:fontRef idx="minor">
+            <a:schemeClr val="tx1"/>
+          </a:fontRef>
+        </p:style>
+      </p:cxnSp>
+      <p:cxnSp>
+        <p:nvCxnSpPr>
+          <p:cNvPr id="57" name="Connecteur en arc 56"/>
+          <p:cNvCxnSpPr>
+            <a:stCxn id="28" idx="2"/>
+          </p:cNvCxnSpPr>
+          <p:nvPr/>
+        </p:nvCxnSpPr>
+        <p:spPr>
+          <a:xfrm rot="5400000">
+            <a:off x="5569113" y="4686993"/>
+            <a:ext cx="774359" cy="560844"/>
+          </a:xfrm>
+          <a:prstGeom prst="curvedConnector3">
+            <a:avLst>
+              <a:gd name="adj1" fmla="val 50000"/>
+            </a:avLst>
+          </a:prstGeom>
+          <a:ln w="76200">
+            <a:solidFill>
+              <a:srgbClr val="7030A0"/>
+            </a:solidFill>
+            <a:tailEnd type="triangle"/>
+          </a:ln>
+        </p:spPr>
+        <p:style>
+          <a:lnRef idx="1">
+            <a:schemeClr val="accent1"/>
+          </a:lnRef>
+          <a:fillRef idx="0">
+            <a:schemeClr val="accent1"/>
+          </a:fillRef>
+          <a:effectRef idx="0">
+            <a:schemeClr val="accent1"/>
+          </a:effectRef>
+          <a:fontRef idx="minor">
+            <a:schemeClr val="tx1"/>
+          </a:fontRef>
+        </p:style>
+      </p:cxnSp>
+      <p:cxnSp>
+        <p:nvCxnSpPr>
+          <p:cNvPr id="61" name="Connecteur en arc 60"/>
+          <p:cNvCxnSpPr>
+            <a:stCxn id="6" idx="0"/>
+          </p:cNvCxnSpPr>
+          <p:nvPr/>
+        </p:nvCxnSpPr>
+        <p:spPr>
+          <a:xfrm rot="16200000" flipV="1">
+            <a:off x="2131899" y="1303280"/>
+            <a:ext cx="2410479" cy="2143466"/>
+          </a:xfrm>
+          <a:prstGeom prst="curvedConnector3">
+            <a:avLst>
+              <a:gd name="adj1" fmla="val 50000"/>
+            </a:avLst>
+          </a:prstGeom>
+          <a:ln w="76200">
+            <a:tailEnd type="triangle"/>
+          </a:ln>
+        </p:spPr>
+        <p:style>
+          <a:lnRef idx="1">
+            <a:schemeClr val="accent4"/>
+          </a:lnRef>
+          <a:fillRef idx="0">
+            <a:schemeClr val="accent4"/>
+          </a:fillRef>
+          <a:effectRef idx="0">
+            <a:schemeClr val="accent4"/>
+          </a:effectRef>
+          <a:fontRef idx="minor">
+            <a:schemeClr val="tx1"/>
+          </a:fontRef>
+        </p:style>
+      </p:cxnSp>
+    </p:spTree>
+    <p:extLst>
+      <p:ext uri="{BB962C8B-B14F-4D97-AF65-F5344CB8AC3E}">
+        <p14:creationId xmlns:p14="http://schemas.microsoft.com/office/powerpoint/2010/main" val="3953185850"/>
+      </p:ext>
+    </p:extLst>
+  </p:cSld>
+  <p:clrMapOvr>
+    <a:masterClrMapping/>
+  </p:clrMapOvr>
+</p:sld>
+</file>
+
+<file path=ppt/slides/slide3.xml><?xml version="1.0" encoding="utf-8"?>
+<p:sld xmlns:a="http://schemas.openxmlformats.org/drawingml/2006/main" xmlns:r="http://schemas.openxmlformats.org/officeDocument/2006/relationships" xmlns:p="http://schemas.openxmlformats.org/presentationml/2006/main">
+  <p:cSld>
+    <p:spTree>
+      <p:nvGrpSpPr>
+        <p:cNvPr id="1" name=""/>
+        <p:cNvGrpSpPr/>
+        <p:nvPr/>
+      </p:nvGrpSpPr>
+      <p:grpSpPr>
+        <a:xfrm>
+          <a:off x="0" y="0"/>
+          <a:ext cx="0" cy="0"/>
+          <a:chOff x="0" y="0"/>
+          <a:chExt cx="0" cy="0"/>
+        </a:xfrm>
+      </p:grpSpPr>
+      <p:pic>
+        <p:nvPicPr>
+          <p:cNvPr id="4" name="Image 3"/>
+          <p:cNvPicPr>
+            <a:picLocks noChangeAspect="1"/>
+          </p:cNvPicPr>
+          <p:nvPr/>
+        </p:nvPicPr>
+        <p:blipFill>
+          <a:blip r:embed="rId2">
+            <a:extLst>
+              <a:ext uri="{28A0092B-C50C-407E-A947-70E740481C1C}">
+                <a14:useLocalDpi xmlns:a14="http://schemas.microsoft.com/office/drawing/2010/main" val="0"/>
+              </a:ext>
+            </a:extLst>
+          </a:blip>
+          <a:stretch>
+            <a:fillRect/>
+          </a:stretch>
+        </p:blipFill>
+        <p:spPr>
+          <a:xfrm>
+            <a:off x="952467" y="296562"/>
+            <a:ext cx="9976348" cy="6297827"/>
+          </a:xfrm>
+          <a:prstGeom prst="rect">
+            <a:avLst/>
+          </a:prstGeom>
+        </p:spPr>
+      </p:pic>
+      <p:sp>
+        <p:nvSpPr>
+          <p:cNvPr id="5" name="Rectangle à coins arrondis 4"/>
+          <p:cNvSpPr/>
+          <p:nvPr/>
+        </p:nvSpPr>
+        <p:spPr>
+          <a:xfrm>
+            <a:off x="1112107" y="823784"/>
+            <a:ext cx="3122141" cy="5025082"/>
+          </a:xfrm>
+          <a:prstGeom prst="roundRect">
+            <a:avLst>
+              <a:gd name="adj" fmla="val 3444"/>
+            </a:avLst>
+          </a:prstGeom>
+          <a:solidFill>
+            <a:schemeClr val="accent6">
+              <a:lumMod val="40000"/>
+              <a:lumOff val="60000"/>
+              <a:alpha val="40000"/>
+            </a:schemeClr>
+          </a:solidFill>
+        </p:spPr>
+        <p:style>
+          <a:lnRef idx="3">
+            <a:schemeClr val="lt1"/>
+          </a:lnRef>
+          <a:fillRef idx="1">
+            <a:schemeClr val="accent1"/>
+          </a:fillRef>
+          <a:effectRef idx="1">
+            <a:schemeClr val="accent1"/>
+          </a:effectRef>
+          <a:fontRef idx="minor">
+            <a:schemeClr val="lt1"/>
+          </a:fontRef>
+        </p:style>
+        <p:txBody>
+          <a:bodyPr rtlCol="0" anchor="b"/>
+          <a:lstStyle/>
+          <a:p>
+            <a:pPr algn="ctr"/>
+            <a:r>
+              <a:rPr lang="fr-FR" smtClean="0">
+                <a:solidFill>
+                  <a:schemeClr val="tx1"/>
+                </a:solidFill>
+              </a:rPr>
+              <a:t>Sélecteur </a:t>
+            </a:r>
+            <a:r>
+              <a:rPr lang="fr-FR" smtClean="0">
+                <a:solidFill>
+                  <a:schemeClr val="tx1"/>
+                </a:solidFill>
+              </a:rPr>
+              <a:t>d’objets</a:t>
+            </a:r>
+            <a:endParaRPr lang="en-GB">
+              <a:solidFill>
+                <a:schemeClr val="tx1"/>
+              </a:solidFill>
+            </a:endParaRPr>
+          </a:p>
+        </p:txBody>
+      </p:sp>
+      <p:sp>
+        <p:nvSpPr>
+          <p:cNvPr id="6" name="Rectangle à coins arrondis 5"/>
+          <p:cNvSpPr/>
+          <p:nvPr/>
+        </p:nvSpPr>
+        <p:spPr>
+          <a:xfrm>
+            <a:off x="4379571" y="823783"/>
+            <a:ext cx="3116862" cy="5025081"/>
+          </a:xfrm>
+          <a:prstGeom prst="roundRect">
+            <a:avLst>
+              <a:gd name="adj" fmla="val 3444"/>
+            </a:avLst>
+          </a:prstGeom>
+          <a:solidFill>
+            <a:schemeClr val="accent1">
+              <a:lumMod val="60000"/>
+              <a:lumOff val="40000"/>
+              <a:alpha val="40000"/>
+            </a:schemeClr>
+          </a:solidFill>
+        </p:spPr>
+        <p:style>
+          <a:lnRef idx="3">
+            <a:schemeClr val="lt1"/>
+          </a:lnRef>
+          <a:fillRef idx="1">
+            <a:schemeClr val="accent1"/>
+          </a:fillRef>
+          <a:effectRef idx="1">
+            <a:schemeClr val="accent1"/>
+          </a:effectRef>
+          <a:fontRef idx="minor">
+            <a:schemeClr val="lt1"/>
+          </a:fontRef>
+        </p:style>
+        <p:txBody>
+          <a:bodyPr rtlCol="0" anchor="b"/>
+          <a:lstStyle/>
+          <a:p>
+            <a:pPr algn="ctr"/>
+            <a:r>
+              <a:rPr lang="fr-FR" smtClean="0">
+                <a:solidFill>
+                  <a:schemeClr val="tx1"/>
+                </a:solidFill>
+              </a:rPr>
+              <a:t>Sélecteur de propriété</a:t>
+            </a:r>
+            <a:endParaRPr lang="en-GB">
+              <a:solidFill>
+                <a:schemeClr val="tx1"/>
+              </a:solidFill>
+            </a:endParaRPr>
+          </a:p>
+        </p:txBody>
+      </p:sp>
+      <p:sp>
+        <p:nvSpPr>
+          <p:cNvPr id="7" name="Rectangle à coins arrondis 6"/>
+          <p:cNvSpPr/>
+          <p:nvPr/>
+        </p:nvSpPr>
+        <p:spPr>
+          <a:xfrm>
+            <a:off x="7661352" y="823782"/>
+            <a:ext cx="3116862" cy="5025081"/>
+          </a:xfrm>
+          <a:prstGeom prst="roundRect">
+            <a:avLst>
+              <a:gd name="adj" fmla="val 3444"/>
+            </a:avLst>
+          </a:prstGeom>
+          <a:solidFill>
+            <a:schemeClr val="accent2">
+              <a:lumMod val="40000"/>
+              <a:lumOff val="60000"/>
+              <a:alpha val="40000"/>
+            </a:schemeClr>
+          </a:solidFill>
+        </p:spPr>
+        <p:style>
+          <a:lnRef idx="3">
+            <a:schemeClr val="lt1"/>
+          </a:lnRef>
+          <a:fillRef idx="1">
+            <a:schemeClr val="accent1"/>
+          </a:fillRef>
+          <a:effectRef idx="1">
+            <a:schemeClr val="accent1"/>
+          </a:effectRef>
+          <a:fontRef idx="minor">
+            <a:schemeClr val="lt1"/>
+          </a:fontRef>
+        </p:style>
+        <p:txBody>
+          <a:bodyPr rtlCol="0" anchor="b"/>
+          <a:lstStyle/>
+          <a:p>
+            <a:pPr algn="ctr"/>
+            <a:r>
+              <a:rPr lang="fr-FR" smtClean="0">
+                <a:solidFill>
+                  <a:schemeClr val="tx1"/>
+                </a:solidFill>
+              </a:rPr>
+              <a:t>Récapitulatif de la liaison</a:t>
+            </a:r>
+            <a:endParaRPr lang="en-GB">
+              <a:solidFill>
+                <a:schemeClr val="tx1"/>
+              </a:solidFill>
+            </a:endParaRPr>
+          </a:p>
+        </p:txBody>
+      </p:sp>
+    </p:spTree>
+    <p:extLst>
+      <p:ext uri="{BB962C8B-B14F-4D97-AF65-F5344CB8AC3E}">
+        <p14:creationId xmlns:p14="http://schemas.microsoft.com/office/powerpoint/2010/main" val="3854161225"/>
+      </p:ext>
+    </p:extLst>
+  </p:cSld>
+  <p:clrMapOvr>
+    <a:masterClrMapping/>
+  </p:clrMapOvr>
+</p:sld>
+</file>
+
+<file path=ppt/slides/slide4.xml><?xml version="1.0" encoding="utf-8"?>
+<p:sld xmlns:a="http://schemas.openxmlformats.org/drawingml/2006/main" xmlns:r="http://schemas.openxmlformats.org/officeDocument/2006/relationships" xmlns:p="http://schemas.openxmlformats.org/presentationml/2006/main">
+  <p:cSld>
+    <p:spTree>
+      <p:nvGrpSpPr>
+        <p:cNvPr id="1" name=""/>
+        <p:cNvGrpSpPr/>
+        <p:nvPr/>
+      </p:nvGrpSpPr>
+      <p:grpSpPr>
+        <a:xfrm>
+          <a:off x="0" y="0"/>
+          <a:ext cx="0" cy="0"/>
+          <a:chOff x="0" y="0"/>
+          <a:chExt cx="0" cy="0"/>
+        </a:xfrm>
+      </p:grpSpPr>
+      <p:pic>
+        <p:nvPicPr>
+          <p:cNvPr id="4" name="Image 3"/>
+          <p:cNvPicPr>
+            <a:picLocks noChangeAspect="1"/>
+          </p:cNvPicPr>
+          <p:nvPr/>
+        </p:nvPicPr>
+        <p:blipFill>
+          <a:blip r:embed="rId2">
+            <a:extLst>
+              <a:ext uri="{28A0092B-C50C-407E-A947-70E740481C1C}">
+                <a14:useLocalDpi xmlns:a14="http://schemas.microsoft.com/office/drawing/2010/main" val="0"/>
+              </a:ext>
+            </a:extLst>
+          </a:blip>
+          <a:stretch>
+            <a:fillRect/>
+          </a:stretch>
+        </p:blipFill>
+        <p:spPr>
+          <a:xfrm>
+            <a:off x="0" y="641382"/>
+            <a:ext cx="12192000" cy="5575236"/>
+          </a:xfrm>
+          <a:prstGeom prst="rect">
+            <a:avLst/>
+          </a:prstGeom>
+        </p:spPr>
+      </p:pic>
+      <p:sp>
+        <p:nvSpPr>
+          <p:cNvPr id="5" name="Rectangle à coins arrondis 4"/>
+          <p:cNvSpPr/>
+          <p:nvPr/>
+        </p:nvSpPr>
+        <p:spPr>
+          <a:xfrm>
+            <a:off x="6377714" y="1916210"/>
+            <a:ext cx="1448232" cy="686948"/>
+          </a:xfrm>
+          <a:prstGeom prst="roundRect">
+            <a:avLst>
+              <a:gd name="adj" fmla="val 3444"/>
+            </a:avLst>
+          </a:prstGeom>
+          <a:solidFill>
+            <a:srgbClr val="FFC000">
+              <a:alpha val="40000"/>
+            </a:srgbClr>
+          </a:solidFill>
+        </p:spPr>
+        <p:style>
+          <a:lnRef idx="3">
+            <a:schemeClr val="lt1"/>
+          </a:lnRef>
+          <a:fillRef idx="1">
+            <a:schemeClr val="accent5"/>
+          </a:fillRef>
+          <a:effectRef idx="1">
+            <a:schemeClr val="accent5"/>
+          </a:effectRef>
+          <a:fontRef idx="minor">
+            <a:schemeClr val="lt1"/>
+          </a:fontRef>
+        </p:style>
+        <p:txBody>
+          <a:bodyPr rtlCol="0" anchor="ctr"/>
+          <a:lstStyle/>
+          <a:p>
+            <a:pPr algn="ctr"/>
+            <a:r>
+              <a:rPr lang="fr-FR" smtClean="0">
+                <a:solidFill>
+                  <a:schemeClr val="tx1"/>
+                </a:solidFill>
+              </a:rPr>
+              <a:t>Couleurs identiques</a:t>
+            </a:r>
+            <a:endParaRPr lang="en-GB">
+              <a:solidFill>
+                <a:schemeClr val="tx1"/>
+              </a:solidFill>
+            </a:endParaRPr>
+          </a:p>
+        </p:txBody>
+      </p:sp>
+      <p:cxnSp>
+        <p:nvCxnSpPr>
+          <p:cNvPr id="6" name="Connecteur en arc 5"/>
+          <p:cNvCxnSpPr>
+            <a:stCxn id="5" idx="1"/>
+          </p:cNvCxnSpPr>
+          <p:nvPr/>
+        </p:nvCxnSpPr>
+        <p:spPr>
+          <a:xfrm rot="10800000" flipV="1">
+            <a:off x="5955958" y="2259684"/>
+            <a:ext cx="421757" cy="475278"/>
+          </a:xfrm>
+          <a:prstGeom prst="curvedConnector2">
+            <a:avLst/>
+          </a:prstGeom>
+          <a:ln w="76200">
+            <a:tailEnd type="triangle"/>
+          </a:ln>
+        </p:spPr>
+        <p:style>
+          <a:lnRef idx="1">
+            <a:schemeClr val="accent4"/>
+          </a:lnRef>
+          <a:fillRef idx="0">
+            <a:schemeClr val="accent4"/>
+          </a:fillRef>
+          <a:effectRef idx="0">
+            <a:schemeClr val="accent4"/>
+          </a:effectRef>
+          <a:fontRef idx="minor">
+            <a:schemeClr val="tx1"/>
+          </a:fontRef>
+        </p:style>
+      </p:cxnSp>
+      <p:cxnSp>
+        <p:nvCxnSpPr>
+          <p:cNvPr id="9" name="Connecteur en arc 8"/>
+          <p:cNvCxnSpPr>
+            <a:stCxn id="5" idx="3"/>
+          </p:cNvCxnSpPr>
+          <p:nvPr/>
+        </p:nvCxnSpPr>
+        <p:spPr>
+          <a:xfrm>
+            <a:off x="7825946" y="2259684"/>
+            <a:ext cx="2195384" cy="1511210"/>
+          </a:xfrm>
+          <a:prstGeom prst="curvedConnector3">
+            <a:avLst>
+              <a:gd name="adj1" fmla="val 50000"/>
+            </a:avLst>
+          </a:prstGeom>
+          <a:ln w="76200">
+            <a:tailEnd type="triangle"/>
+          </a:ln>
+        </p:spPr>
+        <p:style>
+          <a:lnRef idx="1">
+            <a:schemeClr val="accent4"/>
+          </a:lnRef>
+          <a:fillRef idx="0">
+            <a:schemeClr val="accent4"/>
+          </a:fillRef>
+          <a:effectRef idx="0">
+            <a:schemeClr val="accent4"/>
+          </a:effectRef>
+          <a:fontRef idx="minor">
+            <a:schemeClr val="tx1"/>
+          </a:fontRef>
+        </p:style>
+      </p:cxnSp>
+      <p:cxnSp>
+        <p:nvCxnSpPr>
+          <p:cNvPr id="17" name="Connecteur en arc 16"/>
+          <p:cNvCxnSpPr>
+            <a:stCxn id="5" idx="2"/>
+          </p:cNvCxnSpPr>
+          <p:nvPr/>
+        </p:nvCxnSpPr>
+        <p:spPr>
+          <a:xfrm rot="16200000" flipH="1">
+            <a:off x="5930826" y="3774162"/>
+            <a:ext cx="2786040" cy="444032"/>
+          </a:xfrm>
+          <a:prstGeom prst="curvedConnector3">
+            <a:avLst>
+              <a:gd name="adj1" fmla="val 50000"/>
+            </a:avLst>
+          </a:prstGeom>
+          <a:ln w="76200">
+            <a:tailEnd type="triangle"/>
+          </a:ln>
+        </p:spPr>
+        <p:style>
+          <a:lnRef idx="1">
+            <a:schemeClr val="accent4"/>
+          </a:lnRef>
+          <a:fillRef idx="0">
+            <a:schemeClr val="accent4"/>
+          </a:fillRef>
+          <a:effectRef idx="0">
+            <a:schemeClr val="accent4"/>
+          </a:effectRef>
+          <a:fontRef idx="minor">
+            <a:schemeClr val="tx1"/>
+          </a:fontRef>
+        </p:style>
+      </p:cxnSp>
+    </p:spTree>
+    <p:extLst>
+      <p:ext uri="{BB962C8B-B14F-4D97-AF65-F5344CB8AC3E}">
+        <p14:creationId xmlns:p14="http://schemas.microsoft.com/office/powerpoint/2010/main" val="1998582452"/>
+      </p:ext>
+    </p:extLst>
+  </p:cSld>
+  <p:clrMapOvr>
+    <a:masterClrMapping/>
+  </p:clrMapOvr>
+</p:sld>
+</file>
+
 <file path=ppt/theme/theme1.xml><?xml version="1.0" encoding="utf-8"?>
 <a:theme xmlns:a="http://schemas.openxmlformats.org/drawingml/2006/main" name="Thème Office">
   <a:themeElements>

</xml_diff>

<commit_message>
Tutorial 2 page 3 terminé
</commit_message>
<xml_diff>
--- a/sources/maker.pptx
+++ b/sources/maker.pptx
@@ -9,6 +9,8 @@
     <p:sldId id="257" r:id="rId3"/>
     <p:sldId id="258" r:id="rId4"/>
     <p:sldId id="259" r:id="rId5"/>
+    <p:sldId id="260" r:id="rId6"/>
+    <p:sldId id="261" r:id="rId7"/>
   </p:sldIdLst>
   <p:sldSz cx="12192000" cy="6858000"/>
   <p:notesSz cx="6858000" cy="9144000"/>
@@ -246,7 +248,7 @@
           <a:p>
             <a:fld id="{78AEA460-6B09-4BD5-A6BB-D74A7FA93045}" type="datetimeFigureOut">
               <a:rPr lang="en-GB" smtClean="0"/>
-              <a:t>07/11/2017</a:t>
+              <a:t>08/11/2017</a:t>
             </a:fld>
             <a:endParaRPr lang="en-GB"/>
           </a:p>
@@ -416,7 +418,7 @@
           <a:p>
             <a:fld id="{78AEA460-6B09-4BD5-A6BB-D74A7FA93045}" type="datetimeFigureOut">
               <a:rPr lang="en-GB" smtClean="0"/>
-              <a:t>07/11/2017</a:t>
+              <a:t>08/11/2017</a:t>
             </a:fld>
             <a:endParaRPr lang="en-GB"/>
           </a:p>
@@ -596,7 +598,7 @@
           <a:p>
             <a:fld id="{78AEA460-6B09-4BD5-A6BB-D74A7FA93045}" type="datetimeFigureOut">
               <a:rPr lang="en-GB" smtClean="0"/>
-              <a:t>07/11/2017</a:t>
+              <a:t>08/11/2017</a:t>
             </a:fld>
             <a:endParaRPr lang="en-GB"/>
           </a:p>
@@ -766,7 +768,7 @@
           <a:p>
             <a:fld id="{78AEA460-6B09-4BD5-A6BB-D74A7FA93045}" type="datetimeFigureOut">
               <a:rPr lang="en-GB" smtClean="0"/>
-              <a:t>07/11/2017</a:t>
+              <a:t>08/11/2017</a:t>
             </a:fld>
             <a:endParaRPr lang="en-GB"/>
           </a:p>
@@ -1012,7 +1014,7 @@
           <a:p>
             <a:fld id="{78AEA460-6B09-4BD5-A6BB-D74A7FA93045}" type="datetimeFigureOut">
               <a:rPr lang="en-GB" smtClean="0"/>
-              <a:t>07/11/2017</a:t>
+              <a:t>08/11/2017</a:t>
             </a:fld>
             <a:endParaRPr lang="en-GB"/>
           </a:p>
@@ -1244,7 +1246,7 @@
           <a:p>
             <a:fld id="{78AEA460-6B09-4BD5-A6BB-D74A7FA93045}" type="datetimeFigureOut">
               <a:rPr lang="en-GB" smtClean="0"/>
-              <a:t>07/11/2017</a:t>
+              <a:t>08/11/2017</a:t>
             </a:fld>
             <a:endParaRPr lang="en-GB"/>
           </a:p>
@@ -1611,7 +1613,7 @@
           <a:p>
             <a:fld id="{78AEA460-6B09-4BD5-A6BB-D74A7FA93045}" type="datetimeFigureOut">
               <a:rPr lang="en-GB" smtClean="0"/>
-              <a:t>07/11/2017</a:t>
+              <a:t>08/11/2017</a:t>
             </a:fld>
             <a:endParaRPr lang="en-GB"/>
           </a:p>
@@ -1729,7 +1731,7 @@
           <a:p>
             <a:fld id="{78AEA460-6B09-4BD5-A6BB-D74A7FA93045}" type="datetimeFigureOut">
               <a:rPr lang="en-GB" smtClean="0"/>
-              <a:t>07/11/2017</a:t>
+              <a:t>08/11/2017</a:t>
             </a:fld>
             <a:endParaRPr lang="en-GB"/>
           </a:p>
@@ -1824,7 +1826,7 @@
           <a:p>
             <a:fld id="{78AEA460-6B09-4BD5-A6BB-D74A7FA93045}" type="datetimeFigureOut">
               <a:rPr lang="en-GB" smtClean="0"/>
-              <a:t>07/11/2017</a:t>
+              <a:t>08/11/2017</a:t>
             </a:fld>
             <a:endParaRPr lang="en-GB"/>
           </a:p>
@@ -2101,7 +2103,7 @@
           <a:p>
             <a:fld id="{78AEA460-6B09-4BD5-A6BB-D74A7FA93045}" type="datetimeFigureOut">
               <a:rPr lang="en-GB" smtClean="0"/>
-              <a:t>07/11/2017</a:t>
+              <a:t>08/11/2017</a:t>
             </a:fld>
             <a:endParaRPr lang="en-GB"/>
           </a:p>
@@ -2354,7 +2356,7 @@
           <a:p>
             <a:fld id="{78AEA460-6B09-4BD5-A6BB-D74A7FA93045}" type="datetimeFigureOut">
               <a:rPr lang="en-GB" smtClean="0"/>
-              <a:t>07/11/2017</a:t>
+              <a:t>08/11/2017</a:t>
             </a:fld>
             <a:endParaRPr lang="en-GB"/>
           </a:p>
@@ -2567,7 +2569,7 @@
           <a:p>
             <a:fld id="{78AEA460-6B09-4BD5-A6BB-D74A7FA93045}" type="datetimeFigureOut">
               <a:rPr lang="en-GB" smtClean="0"/>
-              <a:t>07/11/2017</a:t>
+              <a:t>08/11/2017</a:t>
             </a:fld>
             <a:endParaRPr lang="en-GB"/>
           </a:p>
@@ -4119,15 +4121,7 @@
                   <a:schemeClr val="tx1"/>
                 </a:solidFill>
               </a:rPr>
-              <a:t>Sélecteur </a:t>
-            </a:r>
-            <a:r>
-              <a:rPr lang="fr-FR" smtClean="0">
-                <a:solidFill>
-                  <a:schemeClr val="tx1"/>
-                </a:solidFill>
-              </a:rPr>
-              <a:t>d’objets</a:t>
+              <a:t>Sélecteur d’objets</a:t>
             </a:r>
             <a:endParaRPr lang="en-GB">
               <a:solidFill>
@@ -4485,6 +4479,526 @@
     <p:extLst>
       <p:ext uri="{BB962C8B-B14F-4D97-AF65-F5344CB8AC3E}">
         <p14:creationId xmlns:p14="http://schemas.microsoft.com/office/powerpoint/2010/main" val="1998582452"/>
+      </p:ext>
+    </p:extLst>
+  </p:cSld>
+  <p:clrMapOvr>
+    <a:masterClrMapping/>
+  </p:clrMapOvr>
+</p:sld>
+</file>
+
+<file path=ppt/slides/slide5.xml><?xml version="1.0" encoding="utf-8"?>
+<p:sld xmlns:a="http://schemas.openxmlformats.org/drawingml/2006/main" xmlns:r="http://schemas.openxmlformats.org/officeDocument/2006/relationships" xmlns:p="http://schemas.openxmlformats.org/presentationml/2006/main">
+  <p:cSld>
+    <p:spTree>
+      <p:nvGrpSpPr>
+        <p:cNvPr id="1" name=""/>
+        <p:cNvGrpSpPr/>
+        <p:nvPr/>
+      </p:nvGrpSpPr>
+      <p:grpSpPr>
+        <a:xfrm>
+          <a:off x="0" y="0"/>
+          <a:ext cx="0" cy="0"/>
+          <a:chOff x="0" y="0"/>
+          <a:chExt cx="0" cy="0"/>
+        </a:xfrm>
+      </p:grpSpPr>
+      <p:pic>
+        <p:nvPicPr>
+          <p:cNvPr id="5" name="Image 4"/>
+          <p:cNvPicPr>
+            <a:picLocks noChangeAspect="1"/>
+          </p:cNvPicPr>
+          <p:nvPr/>
+        </p:nvPicPr>
+        <p:blipFill>
+          <a:blip r:embed="rId2">
+            <a:extLst>
+              <a:ext uri="{28A0092B-C50C-407E-A947-70E740481C1C}">
+                <a14:useLocalDpi xmlns:a14="http://schemas.microsoft.com/office/drawing/2010/main" val="0"/>
+              </a:ext>
+            </a:extLst>
+          </a:blip>
+          <a:stretch>
+            <a:fillRect/>
+          </a:stretch>
+        </p:blipFill>
+        <p:spPr>
+          <a:xfrm>
+            <a:off x="422217" y="509180"/>
+            <a:ext cx="11526859" cy="5839640"/>
+          </a:xfrm>
+          <a:prstGeom prst="rect">
+            <a:avLst/>
+          </a:prstGeom>
+        </p:spPr>
+      </p:pic>
+      <p:sp>
+        <p:nvSpPr>
+          <p:cNvPr id="7" name="Rectangle à coins arrondis 6"/>
+          <p:cNvSpPr/>
+          <p:nvPr/>
+        </p:nvSpPr>
+        <p:spPr>
+          <a:xfrm>
+            <a:off x="422217" y="1143364"/>
+            <a:ext cx="11371850" cy="1895671"/>
+          </a:xfrm>
+          <a:prstGeom prst="roundRect">
+            <a:avLst>
+              <a:gd name="adj" fmla="val 3778"/>
+            </a:avLst>
+          </a:prstGeom>
+          <a:solidFill>
+            <a:srgbClr val="A365D1">
+              <a:alpha val="40000"/>
+            </a:srgbClr>
+          </a:solidFill>
+        </p:spPr>
+        <p:style>
+          <a:lnRef idx="3">
+            <a:schemeClr val="lt1"/>
+          </a:lnRef>
+          <a:fillRef idx="1">
+            <a:schemeClr val="accent1"/>
+          </a:fillRef>
+          <a:effectRef idx="1">
+            <a:schemeClr val="accent1"/>
+          </a:effectRef>
+          <a:fontRef idx="minor">
+            <a:schemeClr val="lt1"/>
+          </a:fontRef>
+        </p:style>
+        <p:txBody>
+          <a:bodyPr rtlCol="0" anchor="t"/>
+          <a:lstStyle/>
+          <a:p>
+            <a:pPr algn="ctr"/>
+            <a:r>
+              <a:rPr lang="fr-FR" b="1" smtClean="0">
+                <a:solidFill>
+                  <a:schemeClr val="tx1"/>
+                </a:solidFill>
+              </a:rPr>
+              <a:t>Source de données: </a:t>
+            </a:r>
+            <a:r>
+              <a:rPr lang="fr-FR" i="1" smtClean="0">
+                <a:solidFill>
+                  <a:schemeClr val="tx1"/>
+                </a:solidFill>
+              </a:rPr>
+              <a:t>contexte de l’acteur </a:t>
+            </a:r>
+            <a:r>
+              <a:rPr lang="fr-FR" smtClean="0">
+                <a:solidFill>
+                  <a:schemeClr val="tx1"/>
+                </a:solidFill>
+              </a:rPr>
+              <a:t>ou </a:t>
+            </a:r>
+            <a:r>
+              <a:rPr lang="fr-FR" i="1" smtClean="0">
+                <a:solidFill>
+                  <a:schemeClr val="tx1"/>
+                </a:solidFill>
+              </a:rPr>
+              <a:t>source de donnée spécifique</a:t>
+            </a:r>
+            <a:endParaRPr lang="en-GB" i="1">
+              <a:solidFill>
+                <a:schemeClr val="tx1"/>
+              </a:solidFill>
+            </a:endParaRPr>
+          </a:p>
+        </p:txBody>
+      </p:sp>
+      <p:sp>
+        <p:nvSpPr>
+          <p:cNvPr id="8" name="Rectangle à coins arrondis 7"/>
+          <p:cNvSpPr/>
+          <p:nvPr/>
+        </p:nvSpPr>
+        <p:spPr>
+          <a:xfrm>
+            <a:off x="422217" y="3095516"/>
+            <a:ext cx="11371850" cy="1586753"/>
+          </a:xfrm>
+          <a:prstGeom prst="roundRect">
+            <a:avLst>
+              <a:gd name="adj" fmla="val 3778"/>
+            </a:avLst>
+          </a:prstGeom>
+          <a:solidFill>
+            <a:schemeClr val="accent2">
+              <a:alpha val="40000"/>
+            </a:schemeClr>
+          </a:solidFill>
+        </p:spPr>
+        <p:style>
+          <a:lnRef idx="3">
+            <a:schemeClr val="lt1"/>
+          </a:lnRef>
+          <a:fillRef idx="1">
+            <a:schemeClr val="accent1"/>
+          </a:fillRef>
+          <a:effectRef idx="1">
+            <a:schemeClr val="accent1"/>
+          </a:effectRef>
+          <a:fontRef idx="minor">
+            <a:schemeClr val="lt1"/>
+          </a:fontRef>
+        </p:style>
+        <p:txBody>
+          <a:bodyPr rtlCol="0" anchor="t"/>
+          <a:lstStyle/>
+          <a:p>
+            <a:pPr algn="ctr"/>
+            <a:r>
+              <a:rPr lang="fr-FR" b="1" smtClean="0">
+                <a:solidFill>
+                  <a:schemeClr val="tx1"/>
+                </a:solidFill>
+              </a:rPr>
+              <a:t>Contexte: </a:t>
+            </a:r>
+            <a:r>
+              <a:rPr lang="fr-FR" i="1" smtClean="0">
+                <a:solidFill>
+                  <a:schemeClr val="tx1"/>
+                </a:solidFill>
+              </a:rPr>
+              <a:t>attribut de la donnée</a:t>
+            </a:r>
+            <a:endParaRPr lang="en-GB" i="1">
+              <a:solidFill>
+                <a:schemeClr val="tx1"/>
+              </a:solidFill>
+            </a:endParaRPr>
+          </a:p>
+        </p:txBody>
+      </p:sp>
+      <p:sp>
+        <p:nvSpPr>
+          <p:cNvPr id="9" name="Rectangle à coins arrondis 8"/>
+          <p:cNvSpPr/>
+          <p:nvPr/>
+        </p:nvSpPr>
+        <p:spPr>
+          <a:xfrm>
+            <a:off x="422217" y="4738751"/>
+            <a:ext cx="11371850" cy="1586753"/>
+          </a:xfrm>
+          <a:prstGeom prst="roundRect">
+            <a:avLst>
+              <a:gd name="adj" fmla="val 3778"/>
+            </a:avLst>
+          </a:prstGeom>
+          <a:solidFill>
+            <a:schemeClr val="accent6">
+              <a:lumMod val="60000"/>
+              <a:lumOff val="40000"/>
+              <a:alpha val="40000"/>
+            </a:schemeClr>
+          </a:solidFill>
+        </p:spPr>
+        <p:style>
+          <a:lnRef idx="3">
+            <a:schemeClr val="lt1"/>
+          </a:lnRef>
+          <a:fillRef idx="1">
+            <a:schemeClr val="accent1"/>
+          </a:fillRef>
+          <a:effectRef idx="1">
+            <a:schemeClr val="accent1"/>
+          </a:effectRef>
+          <a:fontRef idx="minor">
+            <a:schemeClr val="lt1"/>
+          </a:fontRef>
+        </p:style>
+        <p:txBody>
+          <a:bodyPr rtlCol="0" anchor="t"/>
+          <a:lstStyle/>
+          <a:p>
+            <a:pPr algn="ctr"/>
+            <a:r>
+              <a:rPr lang="fr-FR" b="1" smtClean="0">
+                <a:solidFill>
+                  <a:schemeClr val="tx1"/>
+                </a:solidFill>
+              </a:rPr>
+              <a:t>Accès: </a:t>
+            </a:r>
+            <a:r>
+              <a:rPr lang="fr-FR" i="1" smtClean="0">
+                <a:solidFill>
+                  <a:schemeClr val="tx1"/>
+                </a:solidFill>
+              </a:rPr>
+              <a:t>lecture/écriture</a:t>
+            </a:r>
+            <a:r>
+              <a:rPr lang="fr-FR" smtClean="0">
+                <a:solidFill>
+                  <a:schemeClr val="tx1"/>
+                </a:solidFill>
+              </a:rPr>
+              <a:t>, </a:t>
+            </a:r>
+            <a:r>
+              <a:rPr lang="fr-FR" i="1" smtClean="0">
+                <a:solidFill>
+                  <a:schemeClr val="tx1"/>
+                </a:solidFill>
+              </a:rPr>
+              <a:t>rafraichie/initialisé</a:t>
+            </a:r>
+            <a:endParaRPr lang="en-GB" i="1">
+              <a:solidFill>
+                <a:schemeClr val="tx1"/>
+              </a:solidFill>
+            </a:endParaRPr>
+          </a:p>
+        </p:txBody>
+      </p:sp>
+    </p:spTree>
+    <p:extLst>
+      <p:ext uri="{BB962C8B-B14F-4D97-AF65-F5344CB8AC3E}">
+        <p14:creationId xmlns:p14="http://schemas.microsoft.com/office/powerpoint/2010/main" val="393985809"/>
+      </p:ext>
+    </p:extLst>
+  </p:cSld>
+  <p:clrMapOvr>
+    <a:masterClrMapping/>
+  </p:clrMapOvr>
+</p:sld>
+</file>
+
+<file path=ppt/slides/slide6.xml><?xml version="1.0" encoding="utf-8"?>
+<p:sld xmlns:a="http://schemas.openxmlformats.org/drawingml/2006/main" xmlns:r="http://schemas.openxmlformats.org/officeDocument/2006/relationships" xmlns:p="http://schemas.openxmlformats.org/presentationml/2006/main">
+  <p:cSld>
+    <p:spTree>
+      <p:nvGrpSpPr>
+        <p:cNvPr id="1" name=""/>
+        <p:cNvGrpSpPr/>
+        <p:nvPr/>
+      </p:nvGrpSpPr>
+      <p:grpSpPr>
+        <a:xfrm>
+          <a:off x="0" y="0"/>
+          <a:ext cx="0" cy="0"/>
+          <a:chOff x="0" y="0"/>
+          <a:chExt cx="0" cy="0"/>
+        </a:xfrm>
+      </p:grpSpPr>
+      <p:pic>
+        <p:nvPicPr>
+          <p:cNvPr id="2" name="Image 1"/>
+          <p:cNvPicPr>
+            <a:picLocks noChangeAspect="1"/>
+          </p:cNvPicPr>
+          <p:nvPr/>
+        </p:nvPicPr>
+        <p:blipFill>
+          <a:blip r:embed="rId2"/>
+          <a:stretch>
+            <a:fillRect/>
+          </a:stretch>
+        </p:blipFill>
+        <p:spPr>
+          <a:xfrm>
+            <a:off x="102220" y="1129553"/>
+            <a:ext cx="12013792" cy="4975410"/>
+          </a:xfrm>
+          <a:prstGeom prst="rect">
+            <a:avLst/>
+          </a:prstGeom>
+        </p:spPr>
+      </p:pic>
+      <p:sp>
+        <p:nvSpPr>
+          <p:cNvPr id="4" name="Rectangle à coins arrondis 3"/>
+          <p:cNvSpPr/>
+          <p:nvPr/>
+        </p:nvSpPr>
+        <p:spPr>
+          <a:xfrm>
+            <a:off x="4665800" y="2468630"/>
+            <a:ext cx="1509247" cy="999984"/>
+          </a:xfrm>
+          <a:prstGeom prst="roundRect">
+            <a:avLst>
+              <a:gd name="adj" fmla="val 3778"/>
+            </a:avLst>
+          </a:prstGeom>
+          <a:solidFill>
+            <a:srgbClr val="7030A0">
+              <a:alpha val="40000"/>
+            </a:srgbClr>
+          </a:solidFill>
+        </p:spPr>
+        <p:style>
+          <a:lnRef idx="3">
+            <a:schemeClr val="lt1"/>
+          </a:lnRef>
+          <a:fillRef idx="1">
+            <a:schemeClr val="accent1"/>
+          </a:fillRef>
+          <a:effectRef idx="1">
+            <a:schemeClr val="accent1"/>
+          </a:effectRef>
+          <a:fontRef idx="minor">
+            <a:schemeClr val="lt1"/>
+          </a:fontRef>
+        </p:style>
+        <p:txBody>
+          <a:bodyPr rtlCol="0" anchor="ctr"/>
+          <a:lstStyle/>
+          <a:p>
+            <a:pPr algn="ctr"/>
+            <a:r>
+              <a:rPr lang="fr-FR" smtClean="0">
+                <a:solidFill>
+                  <a:schemeClr val="tx1"/>
+                </a:solidFill>
+              </a:rPr>
+              <a:t>Valeurs identiques rafraichies</a:t>
+            </a:r>
+            <a:endParaRPr lang="en-GB">
+              <a:solidFill>
+                <a:schemeClr val="tx1"/>
+              </a:solidFill>
+            </a:endParaRPr>
+          </a:p>
+        </p:txBody>
+      </p:sp>
+      <p:cxnSp>
+        <p:nvCxnSpPr>
+          <p:cNvPr id="5" name="Connecteur en arc 4"/>
+          <p:cNvCxnSpPr>
+            <a:stCxn id="4" idx="3"/>
+          </p:cNvCxnSpPr>
+          <p:nvPr/>
+        </p:nvCxnSpPr>
+        <p:spPr>
+          <a:xfrm>
+            <a:off x="6175047" y="2968622"/>
+            <a:ext cx="3237894" cy="939990"/>
+          </a:xfrm>
+          <a:prstGeom prst="curvedConnector3">
+            <a:avLst>
+              <a:gd name="adj1" fmla="val 50000"/>
+            </a:avLst>
+          </a:prstGeom>
+          <a:ln w="76200">
+            <a:solidFill>
+              <a:srgbClr val="7030A0"/>
+            </a:solidFill>
+            <a:tailEnd type="triangle"/>
+          </a:ln>
+        </p:spPr>
+        <p:style>
+          <a:lnRef idx="1">
+            <a:schemeClr val="accent1"/>
+          </a:lnRef>
+          <a:fillRef idx="0">
+            <a:schemeClr val="accent1"/>
+          </a:fillRef>
+          <a:effectRef idx="0">
+            <a:schemeClr val="accent1"/>
+          </a:effectRef>
+          <a:fontRef idx="minor">
+            <a:schemeClr val="tx1"/>
+          </a:fontRef>
+        </p:style>
+      </p:cxnSp>
+      <p:cxnSp>
+        <p:nvCxnSpPr>
+          <p:cNvPr id="8" name="Connecteur en arc 7"/>
+          <p:cNvCxnSpPr>
+            <a:stCxn id="4" idx="2"/>
+          </p:cNvCxnSpPr>
+          <p:nvPr/>
+        </p:nvCxnSpPr>
+        <p:spPr>
+          <a:xfrm rot="5400000">
+            <a:off x="3763202" y="3479554"/>
+            <a:ext cx="1668163" cy="1646282"/>
+          </a:xfrm>
+          <a:prstGeom prst="curvedConnector3">
+            <a:avLst>
+              <a:gd name="adj1" fmla="val 50000"/>
+            </a:avLst>
+          </a:prstGeom>
+          <a:ln w="76200">
+            <a:solidFill>
+              <a:srgbClr val="7030A0"/>
+            </a:solidFill>
+            <a:tailEnd type="triangle"/>
+          </a:ln>
+        </p:spPr>
+        <p:style>
+          <a:lnRef idx="1">
+            <a:schemeClr val="accent1"/>
+          </a:lnRef>
+          <a:fillRef idx="0">
+            <a:schemeClr val="accent1"/>
+          </a:fillRef>
+          <a:effectRef idx="0">
+            <a:schemeClr val="accent1"/>
+          </a:effectRef>
+          <a:fontRef idx="minor">
+            <a:schemeClr val="tx1"/>
+          </a:fontRef>
+        </p:style>
+      </p:cxnSp>
+      <p:cxnSp>
+        <p:nvCxnSpPr>
+          <p:cNvPr id="19" name="Connecteur en arc 18"/>
+          <p:cNvCxnSpPr>
+            <a:stCxn id="4" idx="1"/>
+          </p:cNvCxnSpPr>
+          <p:nvPr/>
+        </p:nvCxnSpPr>
+        <p:spPr>
+          <a:xfrm rot="10800000">
+            <a:off x="4159624" y="2468630"/>
+            <a:ext cx="506176" cy="499992"/>
+          </a:xfrm>
+          <a:prstGeom prst="curvedConnector3">
+            <a:avLst>
+              <a:gd name="adj1" fmla="val 50000"/>
+            </a:avLst>
+          </a:prstGeom>
+          <a:ln w="76200">
+            <a:solidFill>
+              <a:srgbClr val="7030A0"/>
+            </a:solidFill>
+            <a:tailEnd type="triangle"/>
+          </a:ln>
+        </p:spPr>
+        <p:style>
+          <a:lnRef idx="1">
+            <a:schemeClr val="accent1"/>
+          </a:lnRef>
+          <a:fillRef idx="0">
+            <a:schemeClr val="accent1"/>
+          </a:fillRef>
+          <a:effectRef idx="0">
+            <a:schemeClr val="accent1"/>
+          </a:effectRef>
+          <a:fontRef idx="minor">
+            <a:schemeClr val="tx1"/>
+          </a:fontRef>
+        </p:style>
+      </p:cxnSp>
+    </p:spTree>
+    <p:extLst>
+      <p:ext uri="{BB962C8B-B14F-4D97-AF65-F5344CB8AC3E}">
+        <p14:creationId xmlns:p14="http://schemas.microsoft.com/office/powerpoint/2010/main" val="3535002809"/>
       </p:ext>
     </p:extLst>
   </p:cSld>

</xml_diff>

<commit_message>
Tutorial 2 finalisé sans relecture
</commit_message>
<xml_diff>
--- a/sources/maker.pptx
+++ b/sources/maker.pptx
@@ -11,6 +11,7 @@
     <p:sldId id="259" r:id="rId5"/>
     <p:sldId id="260" r:id="rId6"/>
     <p:sldId id="261" r:id="rId7"/>
+    <p:sldId id="262" r:id="rId8"/>
   </p:sldIdLst>
   <p:sldSz cx="12192000" cy="6858000"/>
   <p:notesSz cx="6858000" cy="9144000"/>
@@ -248,7 +249,7 @@
           <a:p>
             <a:fld id="{78AEA460-6B09-4BD5-A6BB-D74A7FA93045}" type="datetimeFigureOut">
               <a:rPr lang="en-GB" smtClean="0"/>
-              <a:t>08/11/2017</a:t>
+              <a:t>10/11/2017</a:t>
             </a:fld>
             <a:endParaRPr lang="en-GB"/>
           </a:p>
@@ -418,7 +419,7 @@
           <a:p>
             <a:fld id="{78AEA460-6B09-4BD5-A6BB-D74A7FA93045}" type="datetimeFigureOut">
               <a:rPr lang="en-GB" smtClean="0"/>
-              <a:t>08/11/2017</a:t>
+              <a:t>10/11/2017</a:t>
             </a:fld>
             <a:endParaRPr lang="en-GB"/>
           </a:p>
@@ -598,7 +599,7 @@
           <a:p>
             <a:fld id="{78AEA460-6B09-4BD5-A6BB-D74A7FA93045}" type="datetimeFigureOut">
               <a:rPr lang="en-GB" smtClean="0"/>
-              <a:t>08/11/2017</a:t>
+              <a:t>10/11/2017</a:t>
             </a:fld>
             <a:endParaRPr lang="en-GB"/>
           </a:p>
@@ -768,7 +769,7 @@
           <a:p>
             <a:fld id="{78AEA460-6B09-4BD5-A6BB-D74A7FA93045}" type="datetimeFigureOut">
               <a:rPr lang="en-GB" smtClean="0"/>
-              <a:t>08/11/2017</a:t>
+              <a:t>10/11/2017</a:t>
             </a:fld>
             <a:endParaRPr lang="en-GB"/>
           </a:p>
@@ -1014,7 +1015,7 @@
           <a:p>
             <a:fld id="{78AEA460-6B09-4BD5-A6BB-D74A7FA93045}" type="datetimeFigureOut">
               <a:rPr lang="en-GB" smtClean="0"/>
-              <a:t>08/11/2017</a:t>
+              <a:t>10/11/2017</a:t>
             </a:fld>
             <a:endParaRPr lang="en-GB"/>
           </a:p>
@@ -1246,7 +1247,7 @@
           <a:p>
             <a:fld id="{78AEA460-6B09-4BD5-A6BB-D74A7FA93045}" type="datetimeFigureOut">
               <a:rPr lang="en-GB" smtClean="0"/>
-              <a:t>08/11/2017</a:t>
+              <a:t>10/11/2017</a:t>
             </a:fld>
             <a:endParaRPr lang="en-GB"/>
           </a:p>
@@ -1613,7 +1614,7 @@
           <a:p>
             <a:fld id="{78AEA460-6B09-4BD5-A6BB-D74A7FA93045}" type="datetimeFigureOut">
               <a:rPr lang="en-GB" smtClean="0"/>
-              <a:t>08/11/2017</a:t>
+              <a:t>10/11/2017</a:t>
             </a:fld>
             <a:endParaRPr lang="en-GB"/>
           </a:p>
@@ -1731,7 +1732,7 @@
           <a:p>
             <a:fld id="{78AEA460-6B09-4BD5-A6BB-D74A7FA93045}" type="datetimeFigureOut">
               <a:rPr lang="en-GB" smtClean="0"/>
-              <a:t>08/11/2017</a:t>
+              <a:t>10/11/2017</a:t>
             </a:fld>
             <a:endParaRPr lang="en-GB"/>
           </a:p>
@@ -1826,7 +1827,7 @@
           <a:p>
             <a:fld id="{78AEA460-6B09-4BD5-A6BB-D74A7FA93045}" type="datetimeFigureOut">
               <a:rPr lang="en-GB" smtClean="0"/>
-              <a:t>08/11/2017</a:t>
+              <a:t>10/11/2017</a:t>
             </a:fld>
             <a:endParaRPr lang="en-GB"/>
           </a:p>
@@ -2103,7 +2104,7 @@
           <a:p>
             <a:fld id="{78AEA460-6B09-4BD5-A6BB-D74A7FA93045}" type="datetimeFigureOut">
               <a:rPr lang="en-GB" smtClean="0"/>
-              <a:t>08/11/2017</a:t>
+              <a:t>10/11/2017</a:t>
             </a:fld>
             <a:endParaRPr lang="en-GB"/>
           </a:p>
@@ -2356,7 +2357,7 @@
           <a:p>
             <a:fld id="{78AEA460-6B09-4BD5-A6BB-D74A7FA93045}" type="datetimeFigureOut">
               <a:rPr lang="en-GB" smtClean="0"/>
-              <a:t>08/11/2017</a:t>
+              <a:t>10/11/2017</a:t>
             </a:fld>
             <a:endParaRPr lang="en-GB"/>
           </a:p>
@@ -2569,7 +2570,7 @@
           <a:p>
             <a:fld id="{78AEA460-6B09-4BD5-A6BB-D74A7FA93045}" type="datetimeFigureOut">
               <a:rPr lang="en-GB" smtClean="0"/>
-              <a:t>08/11/2017</a:t>
+              <a:t>10/11/2017</a:t>
             </a:fld>
             <a:endParaRPr lang="en-GB"/>
           </a:p>
@@ -5008,6 +5009,310 @@
 </p:sld>
 </file>
 
+<file path=ppt/slides/slide7.xml><?xml version="1.0" encoding="utf-8"?>
+<p:sld xmlns:a="http://schemas.openxmlformats.org/drawingml/2006/main" xmlns:r="http://schemas.openxmlformats.org/officeDocument/2006/relationships" xmlns:p="http://schemas.openxmlformats.org/presentationml/2006/main">
+  <p:cSld>
+    <p:spTree>
+      <p:nvGrpSpPr>
+        <p:cNvPr id="1" name=""/>
+        <p:cNvGrpSpPr/>
+        <p:nvPr/>
+      </p:nvGrpSpPr>
+      <p:grpSpPr>
+        <a:xfrm>
+          <a:off x="0" y="0"/>
+          <a:ext cx="0" cy="0"/>
+          <a:chOff x="0" y="0"/>
+          <a:chExt cx="0" cy="0"/>
+        </a:xfrm>
+      </p:grpSpPr>
+      <p:pic>
+        <p:nvPicPr>
+          <p:cNvPr id="2" name="Image 1"/>
+          <p:cNvPicPr>
+            <a:picLocks noChangeAspect="1"/>
+          </p:cNvPicPr>
+          <p:nvPr/>
+        </p:nvPicPr>
+        <p:blipFill>
+          <a:blip r:embed="rId2"/>
+          <a:stretch>
+            <a:fillRect/>
+          </a:stretch>
+        </p:blipFill>
+        <p:spPr>
+          <a:xfrm>
+            <a:off x="980142" y="197708"/>
+            <a:ext cx="10231716" cy="6462584"/>
+          </a:xfrm>
+          <a:prstGeom prst="rect">
+            <a:avLst/>
+          </a:prstGeom>
+        </p:spPr>
+      </p:pic>
+      <p:sp>
+        <p:nvSpPr>
+          <p:cNvPr id="3" name="Rectangle à coins arrondis 2"/>
+          <p:cNvSpPr/>
+          <p:nvPr/>
+        </p:nvSpPr>
+        <p:spPr>
+          <a:xfrm>
+            <a:off x="1079155" y="823782"/>
+            <a:ext cx="3267464" cy="5025083"/>
+          </a:xfrm>
+          <a:prstGeom prst="roundRect">
+            <a:avLst>
+              <a:gd name="adj" fmla="val 3444"/>
+            </a:avLst>
+          </a:prstGeom>
+          <a:solidFill>
+            <a:schemeClr val="accent6">
+              <a:lumMod val="40000"/>
+              <a:lumOff val="60000"/>
+              <a:alpha val="40000"/>
+            </a:schemeClr>
+          </a:solidFill>
+        </p:spPr>
+        <p:style>
+          <a:lnRef idx="3">
+            <a:schemeClr val="lt1"/>
+          </a:lnRef>
+          <a:fillRef idx="1">
+            <a:schemeClr val="accent1"/>
+          </a:fillRef>
+          <a:effectRef idx="1">
+            <a:schemeClr val="accent1"/>
+          </a:effectRef>
+          <a:fontRef idx="minor">
+            <a:schemeClr val="lt1"/>
+          </a:fontRef>
+        </p:style>
+        <p:txBody>
+          <a:bodyPr rtlCol="0" anchor="b"/>
+          <a:lstStyle/>
+          <a:p>
+            <a:pPr algn="ctr"/>
+            <a:r>
+              <a:rPr lang="fr-FR" smtClean="0">
+                <a:solidFill>
+                  <a:schemeClr val="tx1"/>
+                </a:solidFill>
+              </a:rPr>
+              <a:t>Sélection </a:t>
+            </a:r>
+            <a:r>
+              <a:rPr lang="fr-FR" smtClean="0">
+                <a:solidFill>
+                  <a:schemeClr val="tx1"/>
+                </a:solidFill>
+              </a:rPr>
+              <a:t>de </a:t>
+            </a:r>
+            <a:r>
+              <a:rPr lang="fr-FR" smtClean="0">
+                <a:solidFill>
+                  <a:schemeClr val="tx1"/>
+                </a:solidFill>
+              </a:rPr>
+              <a:t>librairie éxistante</a:t>
+            </a:r>
+            <a:endParaRPr lang="en-GB">
+              <a:solidFill>
+                <a:schemeClr val="tx1"/>
+              </a:solidFill>
+            </a:endParaRPr>
+          </a:p>
+        </p:txBody>
+      </p:sp>
+      <p:sp>
+        <p:nvSpPr>
+          <p:cNvPr id="4" name="Rectangle à coins arrondis 3"/>
+          <p:cNvSpPr/>
+          <p:nvPr/>
+        </p:nvSpPr>
+        <p:spPr>
+          <a:xfrm>
+            <a:off x="4503297" y="823783"/>
+            <a:ext cx="3248507" cy="5025081"/>
+          </a:xfrm>
+          <a:prstGeom prst="roundRect">
+            <a:avLst>
+              <a:gd name="adj" fmla="val 3444"/>
+            </a:avLst>
+          </a:prstGeom>
+          <a:solidFill>
+            <a:schemeClr val="accent1">
+              <a:lumMod val="60000"/>
+              <a:lumOff val="40000"/>
+              <a:alpha val="40000"/>
+            </a:schemeClr>
+          </a:solidFill>
+        </p:spPr>
+        <p:style>
+          <a:lnRef idx="3">
+            <a:schemeClr val="lt1"/>
+          </a:lnRef>
+          <a:fillRef idx="1">
+            <a:schemeClr val="accent1"/>
+          </a:fillRef>
+          <a:effectRef idx="1">
+            <a:schemeClr val="accent1"/>
+          </a:effectRef>
+          <a:fontRef idx="minor">
+            <a:schemeClr val="lt1"/>
+          </a:fontRef>
+        </p:style>
+        <p:txBody>
+          <a:bodyPr rtlCol="0" anchor="b"/>
+          <a:lstStyle/>
+          <a:p>
+            <a:pPr algn="ctr"/>
+            <a:r>
+              <a:rPr lang="fr-FR" smtClean="0">
+                <a:solidFill>
+                  <a:schemeClr val="tx1"/>
+                </a:solidFill>
+              </a:rPr>
+              <a:t>Création de nouvelle librairie</a:t>
+            </a:r>
+            <a:endParaRPr lang="en-GB">
+              <a:solidFill>
+                <a:schemeClr val="tx1"/>
+              </a:solidFill>
+            </a:endParaRPr>
+          </a:p>
+        </p:txBody>
+      </p:sp>
+      <p:sp>
+        <p:nvSpPr>
+          <p:cNvPr id="5" name="Rectangle à coins arrondis 4"/>
+          <p:cNvSpPr/>
+          <p:nvPr/>
+        </p:nvSpPr>
+        <p:spPr>
+          <a:xfrm>
+            <a:off x="7883610" y="823782"/>
+            <a:ext cx="3253947" cy="5025081"/>
+          </a:xfrm>
+          <a:prstGeom prst="roundRect">
+            <a:avLst>
+              <a:gd name="adj" fmla="val 3444"/>
+            </a:avLst>
+          </a:prstGeom>
+          <a:solidFill>
+            <a:schemeClr val="accent2">
+              <a:lumMod val="40000"/>
+              <a:lumOff val="60000"/>
+              <a:alpha val="40000"/>
+            </a:schemeClr>
+          </a:solidFill>
+        </p:spPr>
+        <p:style>
+          <a:lnRef idx="3">
+            <a:schemeClr val="lt1"/>
+          </a:lnRef>
+          <a:fillRef idx="1">
+            <a:schemeClr val="accent1"/>
+          </a:fillRef>
+          <a:effectRef idx="1">
+            <a:schemeClr val="accent1"/>
+          </a:effectRef>
+          <a:fontRef idx="minor">
+            <a:schemeClr val="lt1"/>
+          </a:fontRef>
+        </p:style>
+        <p:txBody>
+          <a:bodyPr rtlCol="0" anchor="b"/>
+          <a:lstStyle/>
+          <a:p>
+            <a:pPr algn="ctr"/>
+            <a:r>
+              <a:rPr lang="fr-FR" smtClean="0">
+                <a:solidFill>
+                  <a:schemeClr val="tx1"/>
+                </a:solidFill>
+              </a:rPr>
+              <a:t>Récapitulatif de la liaison</a:t>
+            </a:r>
+            <a:endParaRPr lang="en-GB">
+              <a:solidFill>
+                <a:schemeClr val="tx1"/>
+              </a:solidFill>
+            </a:endParaRPr>
+          </a:p>
+        </p:txBody>
+      </p:sp>
+      <p:sp>
+        <p:nvSpPr>
+          <p:cNvPr id="7" name="Rectangle à coins arrondis 6"/>
+          <p:cNvSpPr/>
+          <p:nvPr/>
+        </p:nvSpPr>
+        <p:spPr>
+          <a:xfrm>
+            <a:off x="7883612" y="6030097"/>
+            <a:ext cx="3253946" cy="574877"/>
+          </a:xfrm>
+          <a:prstGeom prst="roundRect">
+            <a:avLst>
+              <a:gd name="adj" fmla="val 21619"/>
+            </a:avLst>
+          </a:prstGeom>
+          <a:solidFill>
+            <a:srgbClr val="002060">
+              <a:alpha val="40000"/>
+            </a:srgbClr>
+          </a:solidFill>
+        </p:spPr>
+        <p:style>
+          <a:lnRef idx="3">
+            <a:schemeClr val="lt1"/>
+          </a:lnRef>
+          <a:fillRef idx="1">
+            <a:schemeClr val="accent1"/>
+          </a:fillRef>
+          <a:effectRef idx="1">
+            <a:schemeClr val="accent1"/>
+          </a:effectRef>
+          <a:fontRef idx="minor">
+            <a:schemeClr val="lt1"/>
+          </a:fontRef>
+        </p:style>
+        <p:txBody>
+          <a:bodyPr rtlCol="0" anchor="t"/>
+          <a:lstStyle/>
+          <a:p>
+            <a:pPr algn="ctr"/>
+            <a:r>
+              <a:rPr lang="fr-FR" smtClean="0">
+                <a:solidFill>
+                  <a:schemeClr val="tx1"/>
+                </a:solidFill>
+              </a:rPr>
+              <a:t>Liaison</a:t>
+            </a:r>
+            <a:endParaRPr lang="en-GB">
+              <a:solidFill>
+                <a:schemeClr val="tx1"/>
+              </a:solidFill>
+            </a:endParaRPr>
+          </a:p>
+        </p:txBody>
+      </p:sp>
+    </p:spTree>
+    <p:extLst>
+      <p:ext uri="{BB962C8B-B14F-4D97-AF65-F5344CB8AC3E}">
+        <p14:creationId xmlns:p14="http://schemas.microsoft.com/office/powerpoint/2010/main" val="470342799"/>
+      </p:ext>
+    </p:extLst>
+  </p:cSld>
+  <p:clrMapOvr>
+    <a:masterClrMapping/>
+  </p:clrMapOvr>
+</p:sld>
+</file>
+
 <file path=ppt/theme/theme1.xml><?xml version="1.0" encoding="utf-8"?>
 <a:theme xmlns:a="http://schemas.openxmlformats.org/drawingml/2006/main" name="Thème Office">
   <a:themeElements>

</xml_diff>

<commit_message>
Modification des snapshot sur le tutorial 2 et les liaisons vers les sources de données
</commit_message>
<xml_diff>
--- a/sources/maker.pptx
+++ b/sources/maker.pptx
@@ -249,7 +249,7 @@
           <a:p>
             <a:fld id="{78AEA460-6B09-4BD5-A6BB-D74A7FA93045}" type="datetimeFigureOut">
               <a:rPr lang="en-GB" smtClean="0"/>
-              <a:t>10/11/2017</a:t>
+              <a:t>18/06/2018</a:t>
             </a:fld>
             <a:endParaRPr lang="en-GB"/>
           </a:p>
@@ -419,7 +419,7 @@
           <a:p>
             <a:fld id="{78AEA460-6B09-4BD5-A6BB-D74A7FA93045}" type="datetimeFigureOut">
               <a:rPr lang="en-GB" smtClean="0"/>
-              <a:t>10/11/2017</a:t>
+              <a:t>18/06/2018</a:t>
             </a:fld>
             <a:endParaRPr lang="en-GB"/>
           </a:p>
@@ -599,7 +599,7 @@
           <a:p>
             <a:fld id="{78AEA460-6B09-4BD5-A6BB-D74A7FA93045}" type="datetimeFigureOut">
               <a:rPr lang="en-GB" smtClean="0"/>
-              <a:t>10/11/2017</a:t>
+              <a:t>18/06/2018</a:t>
             </a:fld>
             <a:endParaRPr lang="en-GB"/>
           </a:p>
@@ -769,7 +769,7 @@
           <a:p>
             <a:fld id="{78AEA460-6B09-4BD5-A6BB-D74A7FA93045}" type="datetimeFigureOut">
               <a:rPr lang="en-GB" smtClean="0"/>
-              <a:t>10/11/2017</a:t>
+              <a:t>18/06/2018</a:t>
             </a:fld>
             <a:endParaRPr lang="en-GB"/>
           </a:p>
@@ -1015,7 +1015,7 @@
           <a:p>
             <a:fld id="{78AEA460-6B09-4BD5-A6BB-D74A7FA93045}" type="datetimeFigureOut">
               <a:rPr lang="en-GB" smtClean="0"/>
-              <a:t>10/11/2017</a:t>
+              <a:t>18/06/2018</a:t>
             </a:fld>
             <a:endParaRPr lang="en-GB"/>
           </a:p>
@@ -1247,7 +1247,7 @@
           <a:p>
             <a:fld id="{78AEA460-6B09-4BD5-A6BB-D74A7FA93045}" type="datetimeFigureOut">
               <a:rPr lang="en-GB" smtClean="0"/>
-              <a:t>10/11/2017</a:t>
+              <a:t>18/06/2018</a:t>
             </a:fld>
             <a:endParaRPr lang="en-GB"/>
           </a:p>
@@ -1614,7 +1614,7 @@
           <a:p>
             <a:fld id="{78AEA460-6B09-4BD5-A6BB-D74A7FA93045}" type="datetimeFigureOut">
               <a:rPr lang="en-GB" smtClean="0"/>
-              <a:t>10/11/2017</a:t>
+              <a:t>18/06/2018</a:t>
             </a:fld>
             <a:endParaRPr lang="en-GB"/>
           </a:p>
@@ -1732,7 +1732,7 @@
           <a:p>
             <a:fld id="{78AEA460-6B09-4BD5-A6BB-D74A7FA93045}" type="datetimeFigureOut">
               <a:rPr lang="en-GB" smtClean="0"/>
-              <a:t>10/11/2017</a:t>
+              <a:t>18/06/2018</a:t>
             </a:fld>
             <a:endParaRPr lang="en-GB"/>
           </a:p>
@@ -1827,7 +1827,7 @@
           <a:p>
             <a:fld id="{78AEA460-6B09-4BD5-A6BB-D74A7FA93045}" type="datetimeFigureOut">
               <a:rPr lang="en-GB" smtClean="0"/>
-              <a:t>10/11/2017</a:t>
+              <a:t>18/06/2018</a:t>
             </a:fld>
             <a:endParaRPr lang="en-GB"/>
           </a:p>
@@ -2104,7 +2104,7 @@
           <a:p>
             <a:fld id="{78AEA460-6B09-4BD5-A6BB-D74A7FA93045}" type="datetimeFigureOut">
               <a:rPr lang="en-GB" smtClean="0"/>
-              <a:t>10/11/2017</a:t>
+              <a:t>18/06/2018</a:t>
             </a:fld>
             <a:endParaRPr lang="en-GB"/>
           </a:p>
@@ -2357,7 +2357,7 @@
           <a:p>
             <a:fld id="{78AEA460-6B09-4BD5-A6BB-D74A7FA93045}" type="datetimeFigureOut">
               <a:rPr lang="en-GB" smtClean="0"/>
-              <a:t>10/11/2017</a:t>
+              <a:t>18/06/2018</a:t>
             </a:fld>
             <a:endParaRPr lang="en-GB"/>
           </a:p>
@@ -2570,7 +2570,7 @@
           <a:p>
             <a:fld id="{78AEA460-6B09-4BD5-A6BB-D74A7FA93045}" type="datetimeFigureOut">
               <a:rPr lang="en-GB" smtClean="0"/>
-              <a:t>10/11/2017</a:t>
+              <a:t>18/06/2018</a:t>
             </a:fld>
             <a:endParaRPr lang="en-GB"/>
           </a:p>
@@ -4508,28 +4508,22 @@
       </p:grpSpPr>
       <p:pic>
         <p:nvPicPr>
-          <p:cNvPr id="5" name="Image 4"/>
+          <p:cNvPr id="2" name="Image 1"/>
           <p:cNvPicPr>
             <a:picLocks noChangeAspect="1"/>
           </p:cNvPicPr>
           <p:nvPr/>
         </p:nvPicPr>
         <p:blipFill>
-          <a:blip r:embed="rId2">
-            <a:extLst>
-              <a:ext uri="{28A0092B-C50C-407E-A947-70E740481C1C}">
-                <a14:useLocalDpi xmlns:a14="http://schemas.microsoft.com/office/drawing/2010/main" val="0"/>
-              </a:ext>
-            </a:extLst>
-          </a:blip>
+          <a:blip r:embed="rId2"/>
           <a:stretch>
             <a:fillRect/>
           </a:stretch>
         </p:blipFill>
         <p:spPr>
           <a:xfrm>
-            <a:off x="422217" y="509180"/>
-            <a:ext cx="11526859" cy="5839640"/>
+            <a:off x="211737" y="236065"/>
+            <a:ext cx="11785658" cy="6238876"/>
           </a:xfrm>
           <a:prstGeom prst="rect">
             <a:avLst/>
@@ -4544,8 +4538,8 @@
         </p:nvSpPr>
         <p:spPr>
           <a:xfrm>
-            <a:off x="422217" y="1143364"/>
-            <a:ext cx="11371850" cy="1895671"/>
+            <a:off x="422217" y="873211"/>
+            <a:ext cx="3684197" cy="5368404"/>
           </a:xfrm>
           <a:prstGeom prst="roundRect">
             <a:avLst>
@@ -4577,38 +4571,6 @@
           <a:lstStyle/>
           <a:p>
             <a:pPr algn="ctr"/>
-            <a:r>
-              <a:rPr lang="fr-FR" b="1" smtClean="0">
-                <a:solidFill>
-                  <a:schemeClr val="tx1"/>
-                </a:solidFill>
-              </a:rPr>
-              <a:t>Source de données: </a:t>
-            </a:r>
-            <a:r>
-              <a:rPr lang="fr-FR" i="1" smtClean="0">
-                <a:solidFill>
-                  <a:schemeClr val="tx1"/>
-                </a:solidFill>
-              </a:rPr>
-              <a:t>contexte de l’acteur </a:t>
-            </a:r>
-            <a:r>
-              <a:rPr lang="fr-FR" smtClean="0">
-                <a:solidFill>
-                  <a:schemeClr val="tx1"/>
-                </a:solidFill>
-              </a:rPr>
-              <a:t>ou </a:t>
-            </a:r>
-            <a:r>
-              <a:rPr lang="fr-FR" i="1" smtClean="0">
-                <a:solidFill>
-                  <a:schemeClr val="tx1"/>
-                </a:solidFill>
-              </a:rPr>
-              <a:t>source de donnée spécifique</a:t>
-            </a:r>
             <a:endParaRPr lang="en-GB" i="1">
               <a:solidFill>
                 <a:schemeClr val="tx1"/>
@@ -4625,8 +4587,8 @@
         </p:nvSpPr>
         <p:spPr>
           <a:xfrm>
-            <a:off x="422217" y="3095516"/>
-            <a:ext cx="11371850" cy="1586753"/>
+            <a:off x="4189061" y="873210"/>
+            <a:ext cx="3848232" cy="5368403"/>
           </a:xfrm>
           <a:prstGeom prst="roundRect">
             <a:avLst>
@@ -4658,22 +4620,6 @@
           <a:lstStyle/>
           <a:p>
             <a:pPr algn="ctr"/>
-            <a:r>
-              <a:rPr lang="fr-FR" b="1" smtClean="0">
-                <a:solidFill>
-                  <a:schemeClr val="tx1"/>
-                </a:solidFill>
-              </a:rPr>
-              <a:t>Contexte: </a:t>
-            </a:r>
-            <a:r>
-              <a:rPr lang="fr-FR" i="1" smtClean="0">
-                <a:solidFill>
-                  <a:schemeClr val="tx1"/>
-                </a:solidFill>
-              </a:rPr>
-              <a:t>attribut de la donnée</a:t>
-            </a:r>
             <a:endParaRPr lang="en-GB" i="1">
               <a:solidFill>
                 <a:schemeClr val="tx1"/>
@@ -4690,8 +4636,8 @@
         </p:nvSpPr>
         <p:spPr>
           <a:xfrm>
-            <a:off x="422217" y="4738751"/>
-            <a:ext cx="11371850" cy="1586753"/>
+            <a:off x="8064842" y="873212"/>
+            <a:ext cx="3822357" cy="5368402"/>
           </a:xfrm>
           <a:prstGeom prst="roundRect">
             <a:avLst>
@@ -4725,43 +4671,190 @@
           <a:lstStyle/>
           <a:p>
             <a:pPr algn="ctr"/>
-            <a:r>
-              <a:rPr lang="fr-FR" b="1" smtClean="0">
-                <a:solidFill>
-                  <a:schemeClr val="tx1"/>
-                </a:solidFill>
-              </a:rPr>
-              <a:t>Accès: </a:t>
-            </a:r>
-            <a:r>
-              <a:rPr lang="fr-FR" i="1" smtClean="0">
-                <a:solidFill>
-                  <a:schemeClr val="tx1"/>
-                </a:solidFill>
-              </a:rPr>
-              <a:t>lecture/écriture</a:t>
-            </a:r>
-            <a:r>
-              <a:rPr lang="fr-FR" smtClean="0">
-                <a:solidFill>
-                  <a:schemeClr val="tx1"/>
-                </a:solidFill>
-              </a:rPr>
-              <a:t>, </a:t>
-            </a:r>
-            <a:r>
-              <a:rPr lang="fr-FR" i="1" smtClean="0">
-                <a:solidFill>
-                  <a:schemeClr val="tx1"/>
-                </a:solidFill>
-              </a:rPr>
-              <a:t>rafraichie/initialisé</a:t>
-            </a:r>
             <a:endParaRPr lang="en-GB" i="1">
               <a:solidFill>
                 <a:schemeClr val="tx1"/>
               </a:solidFill>
             </a:endParaRPr>
+          </a:p>
+        </p:txBody>
+      </p:sp>
+      <p:sp>
+        <p:nvSpPr>
+          <p:cNvPr id="3" name="ZoneTexte 2"/>
+          <p:cNvSpPr txBox="1"/>
+          <p:nvPr/>
+        </p:nvSpPr>
+        <p:spPr>
+          <a:xfrm>
+            <a:off x="577313" y="4324864"/>
+            <a:ext cx="3456652" cy="1210963"/>
+          </a:xfrm>
+          <a:prstGeom prst="rect">
+            <a:avLst/>
+          </a:prstGeom>
+          <a:noFill/>
+        </p:spPr>
+        <p:txBody>
+          <a:bodyPr wrap="square" rtlCol="0">
+            <a:spAutoFit/>
+          </a:bodyPr>
+          <a:lstStyle/>
+          <a:p>
+            <a:r>
+              <a:rPr lang="fr-FR" b="1"/>
+              <a:t>Source de données: </a:t>
+            </a:r>
+            <a:r>
+              <a:rPr lang="fr-FR" i="1"/>
+              <a:t>contexte de l’acteur </a:t>
+            </a:r>
+            <a:r>
+              <a:rPr lang="fr-FR"/>
+              <a:t>ou </a:t>
+            </a:r>
+            <a:r>
+              <a:rPr lang="fr-FR" i="1"/>
+              <a:t>source de donnée spécifique</a:t>
+            </a:r>
+            <a:endParaRPr lang="en-GB" i="1"/>
+          </a:p>
+          <a:p>
+            <a:endParaRPr lang="en-GB"/>
+          </a:p>
+        </p:txBody>
+      </p:sp>
+      <p:sp>
+        <p:nvSpPr>
+          <p:cNvPr id="10" name="ZoneTexte 9"/>
+          <p:cNvSpPr txBox="1"/>
+          <p:nvPr/>
+        </p:nvSpPr>
+        <p:spPr>
+          <a:xfrm>
+            <a:off x="5238370" y="2335426"/>
+            <a:ext cx="2431057" cy="923330"/>
+          </a:xfrm>
+          <a:prstGeom prst="rect">
+            <a:avLst/>
+          </a:prstGeom>
+          <a:noFill/>
+        </p:spPr>
+        <p:txBody>
+          <a:bodyPr wrap="square" rtlCol="0">
+            <a:spAutoFit/>
+          </a:bodyPr>
+          <a:lstStyle/>
+          <a:p>
+            <a:r>
+              <a:rPr lang="fr-FR" b="1" smtClean="0"/>
+              <a:t>Propriété de la donnée: </a:t>
+            </a:r>
+            <a:r>
+              <a:rPr lang="fr-FR" i="1" smtClean="0"/>
+              <a:t>valeur, etat, etc</a:t>
+            </a:r>
+            <a:endParaRPr lang="en-GB" i="1"/>
+          </a:p>
+          <a:p>
+            <a:endParaRPr lang="en-GB"/>
+          </a:p>
+        </p:txBody>
+      </p:sp>
+      <p:sp>
+        <p:nvSpPr>
+          <p:cNvPr id="11" name="ZoneTexte 10"/>
+          <p:cNvSpPr txBox="1"/>
+          <p:nvPr/>
+        </p:nvSpPr>
+        <p:spPr>
+          <a:xfrm>
+            <a:off x="8430547" y="1369368"/>
+            <a:ext cx="3456652" cy="369332"/>
+          </a:xfrm>
+          <a:prstGeom prst="rect">
+            <a:avLst/>
+          </a:prstGeom>
+          <a:noFill/>
+        </p:spPr>
+        <p:txBody>
+          <a:bodyPr wrap="square" rtlCol="0">
+            <a:spAutoFit/>
+          </a:bodyPr>
+          <a:lstStyle/>
+          <a:p>
+            <a:r>
+              <a:rPr lang="fr-FR" b="1" smtClean="0"/>
+              <a:t>Mode de lecture et écriture</a:t>
+            </a:r>
+            <a:endParaRPr lang="en-GB"/>
+          </a:p>
+        </p:txBody>
+      </p:sp>
+      <p:sp>
+        <p:nvSpPr>
+          <p:cNvPr id="12" name="ZoneTexte 11"/>
+          <p:cNvSpPr txBox="1"/>
+          <p:nvPr/>
+        </p:nvSpPr>
+        <p:spPr>
+          <a:xfrm>
+            <a:off x="8430547" y="2709172"/>
+            <a:ext cx="3456652" cy="369332"/>
+          </a:xfrm>
+          <a:prstGeom prst="rect">
+            <a:avLst/>
+          </a:prstGeom>
+          <a:noFill/>
+        </p:spPr>
+        <p:txBody>
+          <a:bodyPr wrap="square" rtlCol="0">
+            <a:spAutoFit/>
+          </a:bodyPr>
+          <a:lstStyle/>
+          <a:p>
+            <a:r>
+              <a:rPr lang="fr-FR" b="1" smtClean="0"/>
+              <a:t>Résumé</a:t>
+            </a:r>
+            <a:endParaRPr lang="en-GB"/>
+          </a:p>
+        </p:txBody>
+      </p:sp>
+      <p:sp>
+        <p:nvSpPr>
+          <p:cNvPr id="13" name="ZoneTexte 12"/>
+          <p:cNvSpPr txBox="1"/>
+          <p:nvPr/>
+        </p:nvSpPr>
+        <p:spPr>
+          <a:xfrm>
+            <a:off x="8554518" y="5388781"/>
+            <a:ext cx="3456652" cy="646331"/>
+          </a:xfrm>
+          <a:prstGeom prst="rect">
+            <a:avLst/>
+          </a:prstGeom>
+          <a:noFill/>
+        </p:spPr>
+        <p:txBody>
+          <a:bodyPr wrap="square" rtlCol="0">
+            <a:spAutoFit/>
+          </a:bodyPr>
+          <a:lstStyle/>
+          <a:p>
+            <a:r>
+              <a:rPr lang="fr-FR" b="1" smtClean="0"/>
+              <a:t>Lier: </a:t>
+            </a:r>
+            <a:r>
+              <a:rPr lang="fr-FR" i="1" smtClean="0"/>
+              <a:t>cliquer pour définir</a:t>
+            </a:r>
+            <a:endParaRPr lang="en-GB" i="1"/>
+          </a:p>
+          <a:p>
+            <a:endParaRPr lang="en-GB"/>
           </a:p>
         </p:txBody>
       </p:sp>
@@ -5099,23 +5192,7 @@
                   <a:schemeClr val="tx1"/>
                 </a:solidFill>
               </a:rPr>
-              <a:t>Sélection </a:t>
-            </a:r>
-            <a:r>
-              <a:rPr lang="fr-FR" smtClean="0">
-                <a:solidFill>
-                  <a:schemeClr val="tx1"/>
-                </a:solidFill>
-              </a:rPr>
-              <a:t>de </a:t>
-            </a:r>
-            <a:r>
-              <a:rPr lang="fr-FR" smtClean="0">
-                <a:solidFill>
-                  <a:schemeClr val="tx1"/>
-                </a:solidFill>
-              </a:rPr>
-              <a:t>librairie éxistante</a:t>
+              <a:t>Sélection de librairie éxistante</a:t>
             </a:r>
             <a:endParaRPr lang="en-GB">
               <a:solidFill>

</xml_diff>